<commit_message>
start of 2025 course.
Working on private and public branches from here onwards.
</commit_message>
<xml_diff>
--- a/Session 5/R and data management.pptx
+++ b/Session 5/R and data management.pptx
@@ -5,23 +5,21 @@
     <p:sldMasterId id="2147483648" r:id="rId1"/>
   </p:sldMasterIdLst>
   <p:notesMasterIdLst>
-    <p:notesMasterId r:id="rId16"/>
+    <p:notesMasterId r:id="rId14"/>
   </p:notesMasterIdLst>
   <p:sldIdLst>
     <p:sldId id="271" r:id="rId2"/>
     <p:sldId id="273" r:id="rId3"/>
     <p:sldId id="257" r:id="rId4"/>
     <p:sldId id="258" r:id="rId5"/>
-    <p:sldId id="259" r:id="rId6"/>
-    <p:sldId id="260" r:id="rId7"/>
-    <p:sldId id="261" r:id="rId8"/>
-    <p:sldId id="262" r:id="rId9"/>
-    <p:sldId id="272" r:id="rId10"/>
-    <p:sldId id="263" r:id="rId11"/>
-    <p:sldId id="267" r:id="rId12"/>
-    <p:sldId id="268" r:id="rId13"/>
-    <p:sldId id="269" r:id="rId14"/>
-    <p:sldId id="270" r:id="rId15"/>
+    <p:sldId id="260" r:id="rId6"/>
+    <p:sldId id="274" r:id="rId7"/>
+    <p:sldId id="275" r:id="rId8"/>
+    <p:sldId id="277" r:id="rId9"/>
+    <p:sldId id="276" r:id="rId10"/>
+    <p:sldId id="272" r:id="rId11"/>
+    <p:sldId id="256" r:id="rId12"/>
+    <p:sldId id="270" r:id="rId13"/>
   </p:sldIdLst>
   <p:sldSz cx="12192000" cy="6858000"/>
   <p:notesSz cx="6858000" cy="9144000"/>
@@ -221,7 +219,7 @@
           <a:p>
             <a:fld id="{99CB9AC0-9B39-4E63-A3A3-8B275332B41D}" type="datetimeFigureOut">
               <a:rPr lang="en-US" smtClean="0"/>
-              <a:t>12/5/2024</a:t>
+              <a:t>10/22/2025</a:t>
             </a:fld>
             <a:endParaRPr lang="en-US"/>
           </a:p>
@@ -572,6 +570,91 @@
 </p:notes>
 </file>
 
+<file path=ppt/notesSlides/notesSlide2.xml><?xml version="1.0" encoding="utf-8"?>
+<p:notes xmlns:a="http://schemas.openxmlformats.org/drawingml/2006/main" xmlns:r="http://schemas.openxmlformats.org/officeDocument/2006/relationships" xmlns:p="http://schemas.openxmlformats.org/presentationml/2006/main">
+  <p:cSld>
+    <p:spTree>
+      <p:nvGrpSpPr>
+        <p:cNvPr id="1" name=""/>
+        <p:cNvGrpSpPr/>
+        <p:nvPr/>
+      </p:nvGrpSpPr>
+      <p:grpSpPr>
+        <a:xfrm>
+          <a:off x="0" y="0"/>
+          <a:ext cx="0" cy="0"/>
+          <a:chOff x="0" y="0"/>
+          <a:chExt cx="0" cy="0"/>
+        </a:xfrm>
+      </p:grpSpPr>
+      <p:sp>
+        <p:nvSpPr>
+          <p:cNvPr id="47" name="PlaceHolder 1"/>
+          <p:cNvSpPr>
+            <a:spLocks noGrp="1" noRot="1" noChangeAspect="1"/>
+          </p:cNvSpPr>
+          <p:nvPr>
+            <p:ph type="sldImg"/>
+          </p:nvPr>
+        </p:nvSpPr>
+        <p:spPr>
+          <a:xfrm>
+            <a:off x="823913" y="1006475"/>
+            <a:ext cx="6124575" cy="3446463"/>
+          </a:xfrm>
+          <a:prstGeom prst="rect">
+            <a:avLst/>
+          </a:prstGeom>
+        </p:spPr>
+      </p:sp>
+      <p:sp>
+        <p:nvSpPr>
+          <p:cNvPr id="48" name="PlaceHolder 2"/>
+          <p:cNvSpPr>
+            <a:spLocks noGrp="1"/>
+          </p:cNvSpPr>
+          <p:nvPr>
+            <p:ph type="body"/>
+          </p:nvPr>
+        </p:nvSpPr>
+        <p:spPr>
+          <a:xfrm>
+            <a:off x="1185120" y="4787640"/>
+            <a:ext cx="5407560" cy="5950080"/>
+          </a:xfrm>
+          <a:prstGeom prst="rect">
+            <a:avLst/>
+          </a:prstGeom>
+        </p:spPr>
+        <p:txBody>
+          <a:bodyPr lIns="0" tIns="0" rIns="0" bIns="0"/>
+          <a:lstStyle/>
+          <a:p>
+            <a:r>
+              <a:rPr lang="en-US" sz="2000" b="0" strike="noStrike" spc="-1">
+                <a:latin typeface="Arial"/>
+              </a:rPr>
+              <a:t>A 10‐point checklist to guide researchers toward greater reproducibility in their research. Researchers should give careful thought before, during, and after analysis to ensure reproducibility of their work.</a:t>
+            </a:r>
+          </a:p>
+          <a:p>
+            <a:r>
+              <a:rPr lang="en-US" sz="2000" b="0" strike="noStrike" spc="-1">
+                <a:latin typeface="Arial"/>
+              </a:rPr>
+              <a:t>IF THIS IMAGE HAS BEEN PROVIDED BY OR IS OWNED BY A THIRD PARTY, AS INDICATED IN THE CAPTION LINE, THEN FURTHER PERMISSION MAY BE NEEDED BEFORE ANY FURTHER USE. PLEASE CONTACT WILEY'S PERMISSIONS DEPARTMENT ON PERMISSIONS@WILEY.COM OR USE THE RIGHTSLINK SERVICE BY CLICKING ON THE 'REQUEST PERMISSIONS' LINK ACCOMPANYING THIS ARTICLE. WILEY OR AUTHOR OWNED IMAGES MAY BE USED FOR NON-COMMERCIAL PURPOSES, SUBJECT TO PROPER CITATION OF THE ARTICLE, AUTHOR, AND PUBLISHER. </a:t>
+            </a:r>
+          </a:p>
+        </p:txBody>
+      </p:sp>
+    </p:spTree>
+  </p:cSld>
+  <p:clrMapOvr>
+    <a:masterClrMapping/>
+  </p:clrMapOvr>
+</p:notes>
+</file>
+
 <file path=ppt/slideLayouts/slideLayout1.xml><?xml version="1.0" encoding="utf-8"?>
 <p:sldLayout xmlns:a="http://schemas.openxmlformats.org/drawingml/2006/main" xmlns:r="http://schemas.openxmlformats.org/officeDocument/2006/relationships" xmlns:p="http://schemas.openxmlformats.org/presentationml/2006/main" type="title" preserve="1">
   <p:cSld name="Title Slide">
@@ -719,7 +802,7 @@
           <a:p>
             <a:fld id="{B10E048F-20A3-4554-ABE6-27C654698225}" type="datetimeFigureOut">
               <a:rPr lang="en-US" smtClean="0"/>
-              <a:t>12/5/2024</a:t>
+              <a:t>10/22/2025</a:t>
             </a:fld>
             <a:endParaRPr lang="en-US"/>
           </a:p>
@@ -917,7 +1000,7 @@
           <a:p>
             <a:fld id="{B10E048F-20A3-4554-ABE6-27C654698225}" type="datetimeFigureOut">
               <a:rPr lang="en-US" smtClean="0"/>
-              <a:t>12/5/2024</a:t>
+              <a:t>10/22/2025</a:t>
             </a:fld>
             <a:endParaRPr lang="en-US"/>
           </a:p>
@@ -1125,7 +1208,7 @@
           <a:p>
             <a:fld id="{B10E048F-20A3-4554-ABE6-27C654698225}" type="datetimeFigureOut">
               <a:rPr lang="en-US" smtClean="0"/>
-              <a:t>12/5/2024</a:t>
+              <a:t>10/22/2025</a:t>
             </a:fld>
             <a:endParaRPr lang="en-US"/>
           </a:p>
@@ -1189,6 +1272,96 @@
     <p:extLst>
       <p:ext uri="{BB962C8B-B14F-4D97-AF65-F5344CB8AC3E}">
         <p14:creationId xmlns:p14="http://schemas.microsoft.com/office/powerpoint/2010/main" val="3211206369"/>
+      </p:ext>
+    </p:extLst>
+  </p:cSld>
+  <p:clrMapOvr>
+    <a:masterClrMapping/>
+  </p:clrMapOvr>
+</p:sldLayout>
+</file>
+
+<file path=ppt/slideLayouts/slideLayout12.xml><?xml version="1.0" encoding="utf-8"?>
+<p:sldLayout xmlns:a="http://schemas.openxmlformats.org/drawingml/2006/main" xmlns:r="http://schemas.openxmlformats.org/officeDocument/2006/relationships" xmlns:p="http://schemas.openxmlformats.org/presentationml/2006/main" type="tx">
+  <p:cSld name="1_Title Slide">
+    <p:spTree>
+      <p:nvGrpSpPr>
+        <p:cNvPr id="1" name=""/>
+        <p:cNvGrpSpPr/>
+        <p:nvPr/>
+      </p:nvGrpSpPr>
+      <p:grpSpPr>
+        <a:xfrm>
+          <a:off x="0" y="0"/>
+          <a:ext cx="0" cy="0"/>
+          <a:chOff x="0" y="0"/>
+          <a:chExt cx="0" cy="0"/>
+        </a:xfrm>
+      </p:grpSpPr>
+      <p:sp>
+        <p:nvSpPr>
+          <p:cNvPr id="2" name="PlaceHolder 1"/>
+          <p:cNvSpPr>
+            <a:spLocks noGrp="1"/>
+          </p:cNvSpPr>
+          <p:nvPr>
+            <p:ph type="title"/>
+          </p:nvPr>
+        </p:nvSpPr>
+        <p:spPr>
+          <a:xfrm>
+            <a:off x="609600" y="273600"/>
+            <a:ext cx="10972320" cy="1144800"/>
+          </a:xfrm>
+          <a:prstGeom prst="rect">
+            <a:avLst/>
+          </a:prstGeom>
+        </p:spPr>
+        <p:txBody>
+          <a:bodyPr lIns="0" tIns="0" rIns="0" bIns="0" anchor="ctr"/>
+          <a:lstStyle/>
+          <a:p>
+            <a:pPr algn="ctr"/>
+            <a:endParaRPr lang="en-US" sz="4400" b="0" strike="noStrike" spc="-1">
+              <a:latin typeface="Arial"/>
+            </a:endParaRPr>
+          </a:p>
+        </p:txBody>
+      </p:sp>
+      <p:sp>
+        <p:nvSpPr>
+          <p:cNvPr id="3" name="PlaceHolder 2"/>
+          <p:cNvSpPr>
+            <a:spLocks noGrp="1"/>
+          </p:cNvSpPr>
+          <p:nvPr>
+            <p:ph type="subTitle"/>
+          </p:nvPr>
+        </p:nvSpPr>
+        <p:spPr>
+          <a:xfrm>
+            <a:off x="609600" y="1604520"/>
+            <a:ext cx="10972320" cy="3977280"/>
+          </a:xfrm>
+          <a:prstGeom prst="rect">
+            <a:avLst/>
+          </a:prstGeom>
+        </p:spPr>
+        <p:txBody>
+          <a:bodyPr lIns="0" tIns="0" rIns="0" bIns="0" anchor="ctr"/>
+          <a:lstStyle/>
+          <a:p>
+            <a:pPr algn="ctr"/>
+            <a:endParaRPr lang="en-US" sz="3200" b="0" strike="noStrike" spc="-1">
+              <a:latin typeface="Arial"/>
+            </a:endParaRPr>
+          </a:p>
+        </p:txBody>
+      </p:sp>
+    </p:spTree>
+    <p:extLst>
+      <p:ext uri="{BB962C8B-B14F-4D97-AF65-F5344CB8AC3E}">
+        <p14:creationId xmlns:p14="http://schemas.microsoft.com/office/powerpoint/2010/main" val="2468189799"/>
       </p:ext>
     </p:extLst>
   </p:cSld>
@@ -1323,7 +1496,7 @@
           <a:p>
             <a:fld id="{B10E048F-20A3-4554-ABE6-27C654698225}" type="datetimeFigureOut">
               <a:rPr lang="en-US" smtClean="0"/>
-              <a:t>12/5/2024</a:t>
+              <a:t>10/22/2025</a:t>
             </a:fld>
             <a:endParaRPr lang="en-US"/>
           </a:p>
@@ -1598,7 +1771,7 @@
           <a:p>
             <a:fld id="{B10E048F-20A3-4554-ABE6-27C654698225}" type="datetimeFigureOut">
               <a:rPr lang="en-US" smtClean="0"/>
-              <a:t>12/5/2024</a:t>
+              <a:t>10/22/2025</a:t>
             </a:fld>
             <a:endParaRPr lang="en-US"/>
           </a:p>
@@ -1863,7 +2036,7 @@
           <a:p>
             <a:fld id="{B10E048F-20A3-4554-ABE6-27C654698225}" type="datetimeFigureOut">
               <a:rPr lang="en-US" smtClean="0"/>
-              <a:t>12/5/2024</a:t>
+              <a:t>10/22/2025</a:t>
             </a:fld>
             <a:endParaRPr lang="en-US"/>
           </a:p>
@@ -2275,7 +2448,7 @@
           <a:p>
             <a:fld id="{B10E048F-20A3-4554-ABE6-27C654698225}" type="datetimeFigureOut">
               <a:rPr lang="en-US" smtClean="0"/>
-              <a:t>12/5/2024</a:t>
+              <a:t>10/22/2025</a:t>
             </a:fld>
             <a:endParaRPr lang="en-US"/>
           </a:p>
@@ -2416,7 +2589,7 @@
           <a:p>
             <a:fld id="{B10E048F-20A3-4554-ABE6-27C654698225}" type="datetimeFigureOut">
               <a:rPr lang="en-US" smtClean="0"/>
-              <a:t>12/5/2024</a:t>
+              <a:t>10/22/2025</a:t>
             </a:fld>
             <a:endParaRPr lang="en-US"/>
           </a:p>
@@ -2529,7 +2702,7 @@
           <a:p>
             <a:fld id="{B10E048F-20A3-4554-ABE6-27C654698225}" type="datetimeFigureOut">
               <a:rPr lang="en-US" smtClean="0"/>
-              <a:t>12/5/2024</a:t>
+              <a:t>10/22/2025</a:t>
             </a:fld>
             <a:endParaRPr lang="en-US"/>
           </a:p>
@@ -2840,7 +3013,7 @@
           <a:p>
             <a:fld id="{B10E048F-20A3-4554-ABE6-27C654698225}" type="datetimeFigureOut">
               <a:rPr lang="en-US" smtClean="0"/>
-              <a:t>12/5/2024</a:t>
+              <a:t>10/22/2025</a:t>
             </a:fld>
             <a:endParaRPr lang="en-US"/>
           </a:p>
@@ -3128,7 +3301,7 @@
           <a:p>
             <a:fld id="{B10E048F-20A3-4554-ABE6-27C654698225}" type="datetimeFigureOut">
               <a:rPr lang="en-US" smtClean="0"/>
-              <a:t>12/5/2024</a:t>
+              <a:t>10/22/2025</a:t>
             </a:fld>
             <a:endParaRPr lang="en-US"/>
           </a:p>
@@ -3369,7 +3542,7 @@
           <a:p>
             <a:fld id="{B10E048F-20A3-4554-ABE6-27C654698225}" type="datetimeFigureOut">
               <a:rPr lang="en-US" smtClean="0"/>
-              <a:t>12/5/2024</a:t>
+              <a:t>10/22/2025</a:t>
             </a:fld>
             <a:endParaRPr lang="en-US"/>
           </a:p>
@@ -3485,6 +3658,7 @@
     <p:sldLayoutId id="2147483657" r:id="rId9"/>
     <p:sldLayoutId id="2147483658" r:id="rId10"/>
     <p:sldLayoutId id="2147483659" r:id="rId11"/>
+    <p:sldLayoutId id="2147483660" r:id="rId12"/>
   </p:sldLayoutIdLst>
   <p:txStyles>
     <p:titleStyle>
@@ -3837,8 +4011,8 @@
         </p:nvSpPr>
         <p:spPr>
           <a:xfrm>
-            <a:off x="3158578" y="4472618"/>
-            <a:ext cx="5606092" cy="2546720"/>
+            <a:off x="3158578" y="4973650"/>
+            <a:ext cx="5606092" cy="1653862"/>
           </a:xfrm>
           <a:prstGeom prst="rect">
             <a:avLst/>
@@ -4054,44 +4228,6 @@
               <a:t>Department of Population Health and Reproduction, School of Veterinary Medicine, UC Davis</a:t>
             </a:r>
           </a:p>
-          <a:p>
-            <a:r>
-              <a:rPr lang="en-US" dirty="0">
-                <a:solidFill>
-                  <a:schemeClr val="bg2">
-                    <a:lumMod val="50000"/>
-                  </a:schemeClr>
-                </a:solidFill>
-                <a:latin typeface="Arial"/>
-                <a:cs typeface="Arial"/>
-              </a:rPr>
-              <a:t>Slides Courtesy: Dr. </a:t>
-            </a:r>
-            <a:r>
-              <a:rPr lang="en-US" dirty="0" err="1">
-                <a:solidFill>
-                  <a:schemeClr val="bg2">
-                    <a:lumMod val="50000"/>
-                  </a:schemeClr>
-                </a:solidFill>
-                <a:latin typeface="Arial"/>
-                <a:cs typeface="Arial"/>
-              </a:rPr>
-              <a:t>Nistara</a:t>
-            </a:r>
-            <a:r>
-              <a:rPr lang="en-US" dirty="0">
-                <a:solidFill>
-                  <a:schemeClr val="bg2">
-                    <a:lumMod val="50000"/>
-                  </a:schemeClr>
-                </a:solidFill>
-                <a:latin typeface="Arial"/>
-                <a:cs typeface="Arial"/>
-              </a:rPr>
-              <a:t> Randhawa</a:t>
-            </a:r>
-          </a:p>
         </p:txBody>
       </p:sp>
       <p:pic>
@@ -4207,7 +4343,7 @@
           <p:cNvPr id="10" name="Rectangle 9">
             <a:extLst>
               <a:ext uri="{FF2B5EF4-FFF2-40B4-BE49-F238E27FC236}">
-                <a16:creationId xmlns:a16="http://schemas.microsoft.com/office/drawing/2014/main" id="{DBC6133C-0615-4CE4-9132-37E609A9BDFA}"/>
+                <a16:creationId xmlns:a16="http://schemas.microsoft.com/office/drawing/2014/main" id="{201CC55D-ED54-4C5C-95E6-10947BD1103B}"/>
               </a:ext>
               <a:ext uri="{C183D7F6-B498-43B3-948B-1728B52AA6E4}">
                 <adec:decorative xmlns:adec="http://schemas.microsoft.com/office/drawing/2017/decorative" val="1"/>
@@ -4267,7 +4403,7 @@
           <p:cNvPr id="2" name="Title 1">
             <a:extLst>
               <a:ext uri="{FF2B5EF4-FFF2-40B4-BE49-F238E27FC236}">
-                <a16:creationId xmlns:a16="http://schemas.microsoft.com/office/drawing/2014/main" id="{64239DB1-192A-4734-B53A-013A28E72948}"/>
+                <a16:creationId xmlns:a16="http://schemas.microsoft.com/office/drawing/2014/main" id="{82410C0E-F0C4-3809-BAF5-5AD517A10986}"/>
               </a:ext>
             </a:extLst>
           </p:cNvPr>
@@ -4280,38 +4416,38 @@
         </p:nvSpPr>
         <p:spPr>
           <a:xfrm>
-            <a:off x="645064" y="525982"/>
-            <a:ext cx="4282983" cy="1200361"/>
+            <a:off x="589560" y="856180"/>
+            <a:ext cx="4560584" cy="1128068"/>
           </a:xfrm>
         </p:spPr>
         <p:txBody>
-          <a:bodyPr anchor="b">
-            <a:normAutofit/>
+          <a:bodyPr anchor="ctr">
+            <a:normAutofit fontScale="90000"/>
           </a:bodyPr>
           <a:lstStyle/>
           <a:p>
             <a:r>
-              <a:rPr lang="en-US" sz="3600"/>
-              <a:t>Naming files</a:t>
-            </a:r>
-          </a:p>
-        </p:txBody>
-      </p:sp>
-      <p:sp>
-        <p:nvSpPr>
-          <p:cNvPr id="12" name="Rectangle 11">
-            <a:extLst>
-              <a:ext uri="{FF2B5EF4-FFF2-40B4-BE49-F238E27FC236}">
-                <a16:creationId xmlns:a16="http://schemas.microsoft.com/office/drawing/2014/main" id="{169CC832-2974-4E8D-90ED-3E2941BA7336}"/>
+              <a:rPr lang="en-US" sz="4000" dirty="0"/>
+              <a:t>Version Control you data and code</a:t>
+            </a:r>
+          </a:p>
+        </p:txBody>
+      </p:sp>
+      <p:grpSp>
+        <p:nvGrpSpPr>
+          <p:cNvPr id="12" name="Group 11">
+            <a:extLst>
+              <a:ext uri="{FF2B5EF4-FFF2-40B4-BE49-F238E27FC236}">
+                <a16:creationId xmlns:a16="http://schemas.microsoft.com/office/drawing/2014/main" id="{1DE889C7-FAD6-4397-98E2-05D503484459}"/>
               </a:ext>
               <a:ext uri="{C183D7F6-B498-43B3-948B-1728B52AA6E4}">
                 <adec:decorative xmlns:adec="http://schemas.microsoft.com/office/drawing/2017/decorative" val="1"/>
               </a:ext>
             </a:extLst>
           </p:cNvPr>
-          <p:cNvSpPr>
-            <a:spLocks noGrp="1" noRot="1" noChangeAspect="1" noMove="1" noResize="1" noEditPoints="1" noAdjustHandles="1" noChangeArrowheads="1" noChangeShapeType="1" noTextEdit="1"/>
-          </p:cNvSpPr>
+          <p:cNvGrpSpPr>
+            <a:grpSpLocks noGrp="1" noUngrp="1" noRot="1" noChangeAspect="1" noMove="1" noResize="1"/>
+          </p:cNvGrpSpPr>
           <p:nvPr>
             <p:extLst>
               <p:ext uri="{386F3935-93C4-4BCD-93E2-E3B085C9AB24}">
@@ -4319,11 +4455,165 @@
               </p:ext>
             </p:extLst>
           </p:nvPr>
+        </p:nvGrpSpPr>
+        <p:grpSpPr>
+          <a:xfrm>
+            <a:off x="0" y="1083484"/>
+            <a:ext cx="355196" cy="673460"/>
+            <a:chOff x="0" y="823811"/>
+            <a:chExt cx="355196" cy="673460"/>
+          </a:xfrm>
+        </p:grpSpPr>
+        <p:sp>
+          <p:nvSpPr>
+            <p:cNvPr id="13" name="Rectangle 12">
+              <a:extLst>
+                <a:ext uri="{FF2B5EF4-FFF2-40B4-BE49-F238E27FC236}">
+                  <a16:creationId xmlns:a16="http://schemas.microsoft.com/office/drawing/2014/main" id="{F399A70F-F8CD-4992-9EF5-6CF15472E73F}"/>
+                </a:ext>
+                <a:ext uri="{C183D7F6-B498-43B3-948B-1728B52AA6E4}">
+                  <adec:decorative xmlns:adec="http://schemas.microsoft.com/office/drawing/2017/decorative" val="1"/>
+                </a:ext>
+              </a:extLst>
+            </p:cNvPr>
+            <p:cNvSpPr/>
+            <p:nvPr>
+              <p:extLst>
+                <p:ext uri="{386F3935-93C4-4BCD-93E2-E3B085C9AB24}">
+                  <p16:designElem xmlns:p16="http://schemas.microsoft.com/office/powerpoint/2015/main" val="1"/>
+                </p:ext>
+              </p:extLst>
+            </p:nvPr>
+          </p:nvSpPr>
+          <p:spPr>
+            <a:xfrm>
+              <a:off x="0" y="823811"/>
+              <a:ext cx="87363" cy="673460"/>
+            </a:xfrm>
+            <a:prstGeom prst="rect">
+              <a:avLst/>
+            </a:prstGeom>
+            <a:solidFill>
+              <a:schemeClr val="accent4"/>
+            </a:solidFill>
+            <a:ln>
+              <a:noFill/>
+            </a:ln>
+          </p:spPr>
+          <p:style>
+            <a:lnRef idx="2">
+              <a:schemeClr val="accent1">
+                <a:shade val="50000"/>
+              </a:schemeClr>
+            </a:lnRef>
+            <a:fillRef idx="1">
+              <a:schemeClr val="accent1"/>
+            </a:fillRef>
+            <a:effectRef idx="0">
+              <a:schemeClr val="accent1"/>
+            </a:effectRef>
+            <a:fontRef idx="minor">
+              <a:schemeClr val="lt1"/>
+            </a:fontRef>
+          </p:style>
+          <p:txBody>
+            <a:bodyPr rtlCol="0" anchor="ctr"/>
+            <a:lstStyle/>
+            <a:p>
+              <a:pPr algn="ctr"/>
+              <a:endParaRPr lang="en-US"/>
+            </a:p>
+          </p:txBody>
+        </p:sp>
+        <p:sp>
+          <p:nvSpPr>
+            <p:cNvPr id="14" name="Rectangle 13">
+              <a:extLst>
+                <a:ext uri="{FF2B5EF4-FFF2-40B4-BE49-F238E27FC236}">
+                  <a16:creationId xmlns:a16="http://schemas.microsoft.com/office/drawing/2014/main" id="{48F4FEDC-6D80-458C-A665-075D9B9500FD}"/>
+                </a:ext>
+                <a:ext uri="{C183D7F6-B498-43B3-948B-1728B52AA6E4}">
+                  <adec:decorative xmlns:adec="http://schemas.microsoft.com/office/drawing/2017/decorative" val="1"/>
+                </a:ext>
+              </a:extLst>
+            </p:cNvPr>
+            <p:cNvSpPr/>
+            <p:nvPr>
+              <p:extLst>
+                <p:ext uri="{386F3935-93C4-4BCD-93E2-E3B085C9AB24}">
+                  <p16:designElem xmlns:p16="http://schemas.microsoft.com/office/powerpoint/2015/main" val="1"/>
+                </p:ext>
+              </p:extLst>
+            </p:nvPr>
+          </p:nvSpPr>
+          <p:spPr>
+            <a:xfrm>
+              <a:off x="159341" y="823811"/>
+              <a:ext cx="195855" cy="673460"/>
+            </a:xfrm>
+            <a:prstGeom prst="rect">
+              <a:avLst/>
+            </a:prstGeom>
+            <a:solidFill>
+              <a:schemeClr val="accent4"/>
+            </a:solidFill>
+            <a:ln>
+              <a:noFill/>
+            </a:ln>
+          </p:spPr>
+          <p:style>
+            <a:lnRef idx="2">
+              <a:schemeClr val="accent1">
+                <a:shade val="50000"/>
+              </a:schemeClr>
+            </a:lnRef>
+            <a:fillRef idx="1">
+              <a:schemeClr val="accent1"/>
+            </a:fillRef>
+            <a:effectRef idx="0">
+              <a:schemeClr val="accent1"/>
+            </a:effectRef>
+            <a:fontRef idx="minor">
+              <a:schemeClr val="lt1"/>
+            </a:fontRef>
+          </p:style>
+          <p:txBody>
+            <a:bodyPr rtlCol="0" anchor="ctr"/>
+            <a:lstStyle/>
+            <a:p>
+              <a:pPr algn="ctr"/>
+              <a:endParaRPr lang="en-US"/>
+            </a:p>
+          </p:txBody>
+        </p:sp>
+      </p:grpSp>
+      <p:sp>
+        <p:nvSpPr>
+          <p:cNvPr id="16" name="Rectangle 15">
+            <a:extLst>
+              <a:ext uri="{FF2B5EF4-FFF2-40B4-BE49-F238E27FC236}">
+                <a16:creationId xmlns:a16="http://schemas.microsoft.com/office/drawing/2014/main" id="{3873B707-463F-40B0-8227-E8CC6C67EB25}"/>
+              </a:ext>
+              <a:ext uri="{C183D7F6-B498-43B3-948B-1728B52AA6E4}">
+                <adec:decorative xmlns:adec="http://schemas.microsoft.com/office/drawing/2017/decorative" val="1"/>
+              </a:ext>
+            </a:extLst>
+          </p:cNvPr>
+          <p:cNvSpPr>
+            <a:spLocks noGrp="1" noRot="1" noChangeAspect="1" noMove="1" noResize="1" noEditPoints="1" noAdjustHandles="1" noChangeArrowheads="1" noChangeShapeType="1" noTextEdit="1"/>
+          </p:cNvSpPr>
+          <p:nvPr>
+            <p:extLst>
+              <p:ext uri="{386F3935-93C4-4BCD-93E2-E3B085C9AB24}">
+                <p16:designElem xmlns:p16="http://schemas.microsoft.com/office/powerpoint/2015/main" val="1"/>
+              </p:ext>
+            </p:extLst>
+          </p:nvPr>
         </p:nvSpPr>
         <p:spPr>
           <a:xfrm flipH="1">
-            <a:off x="616533" y="1944913"/>
-            <a:ext cx="4023360" cy="27432"/>
+            <a:off x="665085" y="2090569"/>
+            <a:ext cx="4297680" cy="27432"/>
           </a:xfrm>
           <a:prstGeom prst="rect">
             <a:avLst/>
@@ -4365,7 +4655,7 @@
           <p:cNvPr id="3" name="Content Placeholder 2">
             <a:extLst>
               <a:ext uri="{FF2B5EF4-FFF2-40B4-BE49-F238E27FC236}">
-                <a16:creationId xmlns:a16="http://schemas.microsoft.com/office/drawing/2014/main" id="{BCB550CB-1C44-4AF2-B052-49C64D71C4E6}"/>
+                <a16:creationId xmlns:a16="http://schemas.microsoft.com/office/drawing/2014/main" id="{1D1EE2FF-2181-6760-3BDF-1D33443D5955}"/>
               </a:ext>
             </a:extLst>
           </p:cNvPr>
@@ -4378,8 +4668,8 @@
         </p:nvSpPr>
         <p:spPr>
           <a:xfrm>
-            <a:off x="645066" y="2031101"/>
-            <a:ext cx="4282984" cy="3511943"/>
+            <a:off x="590719" y="2330505"/>
+            <a:ext cx="4559425" cy="3979585"/>
           </a:xfrm>
         </p:spPr>
         <p:txBody>
@@ -4389,44 +4679,52 @@
           <a:lstStyle/>
           <a:p>
             <a:r>
-              <a:rPr lang="en-US" sz="1800" dirty="0">
+              <a:rPr lang="en-US" sz="2000" dirty="0">
                 <a:latin typeface="+mj-lt"/>
               </a:rPr>
-              <a:t>Descriptive</a:t>
-            </a:r>
-          </a:p>
-          <a:p>
-            <a:r>
-              <a:rPr lang="en-US" sz="1800" dirty="0">
+              <a:t>Git: </a:t>
+            </a:r>
+            <a:r>
+              <a:rPr lang="en-US" sz="2000" dirty="0">
+                <a:latin typeface="+mj-lt"/>
+                <a:hlinkClick r:id="rId2"/>
+              </a:rPr>
+              <a:t>https://github.com/</a:t>
+            </a:r>
+            <a:r>
+              <a:rPr lang="en-US" sz="2000" dirty="0">
                 <a:latin typeface="+mj-lt"/>
               </a:rPr>
-              <a:t>Consistent</a:t>
-            </a:r>
-          </a:p>
-          <a:p>
-            <a:r>
-              <a:rPr lang="en-US" sz="1800" dirty="0">
+              <a:t> </a:t>
+            </a:r>
+          </a:p>
+          <a:p>
+            <a:r>
+              <a:rPr lang="en-US" sz="2000" dirty="0">
                 <a:latin typeface="+mj-lt"/>
               </a:rPr>
-              <a:t>Human readable</a:t>
-            </a:r>
-          </a:p>
-          <a:p>
-            <a:r>
-              <a:rPr lang="en-US" sz="1800" dirty="0">
+              <a:t>Drive/Box/Dropbox</a:t>
+            </a:r>
+          </a:p>
+          <a:p>
+            <a:r>
+              <a:rPr lang="en-US" sz="2000" dirty="0">
                 <a:latin typeface="+mj-lt"/>
               </a:rPr>
-              <a:t>Machine readable</a:t>
-            </a:r>
-          </a:p>
-        </p:txBody>
-      </p:sp>
-      <p:sp>
-        <p:nvSpPr>
-          <p:cNvPr id="14" name="Rectangle 13">
-            <a:extLst>
-              <a:ext uri="{FF2B5EF4-FFF2-40B4-BE49-F238E27FC236}">
-                <a16:creationId xmlns:a16="http://schemas.microsoft.com/office/drawing/2014/main" id="{55222F96-971A-4F90-B841-6BAB416C7AC1}"/>
+              <a:t>Local external hard-disk</a:t>
+            </a:r>
+          </a:p>
+          <a:p>
+            <a:endParaRPr lang="en-US" sz="2000" dirty="0"/>
+          </a:p>
+        </p:txBody>
+      </p:sp>
+      <p:sp>
+        <p:nvSpPr>
+          <p:cNvPr id="18" name="Rectangle 17">
+            <a:extLst>
+              <a:ext uri="{FF2B5EF4-FFF2-40B4-BE49-F238E27FC236}">
+                <a16:creationId xmlns:a16="http://schemas.microsoft.com/office/drawing/2014/main" id="{C13237C8-E62C-4F0D-A318-BD6FB6C2D138}"/>
               </a:ext>
               <a:ext uri="{C183D7F6-B498-43B3-948B-1728B52AA6E4}">
                 <adec:decorative xmlns:adec="http://schemas.microsoft.com/office/drawing/2017/decorative" val="1"/>
@@ -4445,9 +4743,9 @@
           </p:nvPr>
         </p:nvSpPr>
         <p:spPr>
-          <a:xfrm rot="5400000">
-            <a:off x="-225843" y="6053360"/>
-            <a:ext cx="740664" cy="154124"/>
+          <a:xfrm flipH="1">
+            <a:off x="10697670" y="0"/>
+            <a:ext cx="1494330" cy="6858000"/>
           </a:xfrm>
           <a:prstGeom prst="rect">
             <a:avLst/>
@@ -4486,10 +4784,10 @@
       </p:sp>
       <p:sp>
         <p:nvSpPr>
-          <p:cNvPr id="16" name="Rectangle 15">
-            <a:extLst>
-              <a:ext uri="{FF2B5EF4-FFF2-40B4-BE49-F238E27FC236}">
-                <a16:creationId xmlns:a16="http://schemas.microsoft.com/office/drawing/2014/main" id="{08980754-6F4B-43C9-B9BE-127B6BED6586}"/>
+          <p:cNvPr id="20" name="Rectangle 19">
+            <a:extLst>
+              <a:ext uri="{FF2B5EF4-FFF2-40B4-BE49-F238E27FC236}">
+                <a16:creationId xmlns:a16="http://schemas.microsoft.com/office/drawing/2014/main" id="{19C9EAEA-39D0-4B0E-A0EB-51E7B26740B1}"/>
               </a:ext>
               <a:ext uri="{C183D7F6-B498-43B3-948B-1728B52AA6E4}">
                 <adec:decorative xmlns:adec="http://schemas.microsoft.com/office/drawing/2017/decorative" val="1"/>
@@ -4508,72 +4806,9 @@
           </p:nvPr>
         </p:nvSpPr>
         <p:spPr>
-          <a:xfrm rot="5400000">
-            <a:off x="5904923" y="215201"/>
-            <a:ext cx="740664" cy="11833491"/>
-          </a:xfrm>
-          <a:prstGeom prst="rect">
-            <a:avLst/>
-          </a:prstGeom>
-          <a:solidFill>
-            <a:schemeClr val="accent4"/>
-          </a:solidFill>
-          <a:ln>
-            <a:noFill/>
-          </a:ln>
-        </p:spPr>
-        <p:style>
-          <a:lnRef idx="2">
-            <a:schemeClr val="accent1">
-              <a:shade val="50000"/>
-            </a:schemeClr>
-          </a:lnRef>
-          <a:fillRef idx="1">
-            <a:schemeClr val="accent1"/>
-          </a:fillRef>
-          <a:effectRef idx="0">
-            <a:schemeClr val="accent1"/>
-          </a:effectRef>
-          <a:fontRef idx="minor">
-            <a:schemeClr val="lt1"/>
-          </a:fontRef>
-        </p:style>
-        <p:txBody>
-          <a:bodyPr rtlCol="0" anchor="ctr"/>
-          <a:lstStyle/>
-          <a:p>
-            <a:pPr algn="ctr"/>
-            <a:endParaRPr lang="en-US"/>
-          </a:p>
-        </p:txBody>
-      </p:sp>
-      <p:sp>
-        <p:nvSpPr>
-          <p:cNvPr id="18" name="Rectangle 17">
-            <a:extLst>
-              <a:ext uri="{FF2B5EF4-FFF2-40B4-BE49-F238E27FC236}">
-                <a16:creationId xmlns:a16="http://schemas.microsoft.com/office/drawing/2014/main" id="{2C1BBA94-3F40-40AA-8BB9-E69E25E537C1}"/>
-              </a:ext>
-              <a:ext uri="{C183D7F6-B498-43B3-948B-1728B52AA6E4}">
-                <adec:decorative xmlns:adec="http://schemas.microsoft.com/office/drawing/2017/decorative" val="1"/>
-              </a:ext>
-            </a:extLst>
-          </p:cNvPr>
-          <p:cNvSpPr>
-            <a:spLocks noGrp="1" noRot="1" noChangeAspect="1" noMove="1" noResize="1" noEditPoints="1" noAdjustHandles="1" noChangeArrowheads="1" noChangeShapeType="1" noTextEdit="1"/>
-          </p:cNvSpPr>
-          <p:nvPr>
-            <p:extLst>
-              <p:ext uri="{386F3935-93C4-4BCD-93E2-E3B085C9AB24}">
-                <p16:designElem xmlns:p16="http://schemas.microsoft.com/office/powerpoint/2015/main" val="1"/>
-              </p:ext>
-            </p:extLst>
-          </p:nvPr>
-        </p:nvSpPr>
-        <p:spPr>
           <a:xfrm>
-            <a:off x="5696793" y="354959"/>
-            <a:ext cx="6184973" cy="5915212"/>
+            <a:off x="5685810" y="513853"/>
+            <a:ext cx="6009366" cy="5834577"/>
           </a:xfrm>
           <a:prstGeom prst="rect">
             <a:avLst/>
@@ -4622,7 +4857,7 @@
           <p:cNvPr id="5" name="Picture 4">
             <a:extLst>
               <a:ext uri="{FF2B5EF4-FFF2-40B4-BE49-F238E27FC236}">
-                <a16:creationId xmlns:a16="http://schemas.microsoft.com/office/drawing/2014/main" id="{1FF36673-E78C-4650-8F4B-E2CCF72F0C1E}"/>
+                <a16:creationId xmlns:a16="http://schemas.microsoft.com/office/drawing/2014/main" id="{E008893F-DF1F-A361-7073-9DAD4A9BE4B0}"/>
               </a:ext>
             </a:extLst>
           </p:cNvPr>
@@ -4631,16 +4866,15 @@
           </p:cNvPicPr>
           <p:nvPr/>
         </p:nvPicPr>
-        <p:blipFill>
-          <a:blip r:embed="rId2"/>
-          <a:stretch>
-            <a:fillRect/>
-          </a:stretch>
+        <p:blipFill rotWithShape="1">
+          <a:blip r:embed="rId3"/>
+          <a:srcRect r="12318" b="3"/>
+          <a:stretch/>
         </p:blipFill>
         <p:spPr>
           <a:xfrm>
-            <a:off x="6672091" y="650494"/>
-            <a:ext cx="4259312" cy="5324142"/>
+            <a:off x="5977788" y="799352"/>
+            <a:ext cx="5425410" cy="5259296"/>
           </a:xfrm>
           <a:prstGeom prst="rect">
             <a:avLst/>
@@ -4650,7 +4884,7 @@
     </p:spTree>
     <p:extLst>
       <p:ext uri="{BB962C8B-B14F-4D97-AF65-F5344CB8AC3E}">
-        <p14:creationId xmlns:p14="http://schemas.microsoft.com/office/powerpoint/2010/main" val="1922443482"/>
+        <p14:creationId xmlns:p14="http://schemas.microsoft.com/office/powerpoint/2010/main" val="1212155217"/>
       </p:ext>
     </p:extLst>
   </p:cSld>
@@ -4677,66 +4911,35 @@
           <a:chExt cx="0" cy="0"/>
         </a:xfrm>
       </p:grpSpPr>
-      <p:sp>
-        <p:nvSpPr>
-          <p:cNvPr id="2" name="Title 1">
-            <a:extLst>
-              <a:ext uri="{FF2B5EF4-FFF2-40B4-BE49-F238E27FC236}">
-                <a16:creationId xmlns:a16="http://schemas.microsoft.com/office/drawing/2014/main" id="{DC105FB6-9FE3-4434-AD43-3D59D7B132BE}"/>
-              </a:ext>
-            </a:extLst>
-          </p:cNvPr>
-          <p:cNvSpPr>
-            <a:spLocks noGrp="1"/>
-          </p:cNvSpPr>
-          <p:nvPr>
-            <p:ph type="title"/>
-          </p:nvPr>
-        </p:nvSpPr>
-        <p:spPr/>
-        <p:txBody>
-          <a:bodyPr/>
-          <a:lstStyle/>
-          <a:p>
-            <a:pPr algn="ctr"/>
-            <a:r>
-              <a:rPr lang="en-US" dirty="0"/>
-              <a:t>RStudio	</a:t>
-            </a:r>
-          </a:p>
-        </p:txBody>
-      </p:sp>
-      <p:sp>
-        <p:nvSpPr>
-          <p:cNvPr id="3" name="Content Placeholder 2">
-            <a:extLst>
-              <a:ext uri="{FF2B5EF4-FFF2-40B4-BE49-F238E27FC236}">
-                <a16:creationId xmlns:a16="http://schemas.microsoft.com/office/drawing/2014/main" id="{1D2CD88F-A139-4441-96D5-ECB80BA49CA0}"/>
-              </a:ext>
-            </a:extLst>
-          </p:cNvPr>
-          <p:cNvSpPr>
-            <a:spLocks noGrp="1"/>
-          </p:cNvSpPr>
-          <p:nvPr>
-            <p:ph idx="1"/>
-          </p:nvPr>
-        </p:nvSpPr>
-        <p:spPr/>
-        <p:txBody>
-          <a:bodyPr/>
-          <a:lstStyle/>
-          <a:p>
-            <a:endParaRPr lang="en-US"/>
-          </a:p>
-        </p:txBody>
-      </p:sp>
       <p:pic>
         <p:nvPicPr>
-          <p:cNvPr id="5" name="Picture 4">
-            <a:extLst>
-              <a:ext uri="{FF2B5EF4-FFF2-40B4-BE49-F238E27FC236}">
-                <a16:creationId xmlns:a16="http://schemas.microsoft.com/office/drawing/2014/main" id="{02275D12-7FA1-4B37-9D99-3AA2F0917F70}"/>
+          <p:cNvPr id="46" name="Main graphic"/>
+          <p:cNvPicPr/>
+          <p:nvPr/>
+        </p:nvPicPr>
+        <p:blipFill>
+          <a:blip r:embed="rId3"/>
+          <a:stretch/>
+        </p:blipFill>
+        <p:spPr>
+          <a:xfrm>
+            <a:off x="3556000" y="0"/>
+            <a:ext cx="5080000" cy="6728616"/>
+          </a:xfrm>
+          <a:prstGeom prst="rect">
+            <a:avLst/>
+          </a:prstGeom>
+          <a:ln>
+            <a:noFill/>
+          </a:ln>
+        </p:spPr>
+      </p:pic>
+      <p:pic>
+        <p:nvPicPr>
+          <p:cNvPr id="2" name="Picture 1">
+            <a:extLst>
+              <a:ext uri="{FF2B5EF4-FFF2-40B4-BE49-F238E27FC236}">
+                <a16:creationId xmlns:a16="http://schemas.microsoft.com/office/drawing/2014/main" id="{88CD8FE2-E1AB-D255-A17F-DC721111F991}"/>
               </a:ext>
             </a:extLst>
           </p:cNvPr>
@@ -4746,15 +4949,15 @@
           <p:nvPr/>
         </p:nvPicPr>
         <p:blipFill>
-          <a:blip r:embed="rId2"/>
+          <a:blip r:embed="rId4"/>
           <a:stretch>
             <a:fillRect/>
           </a:stretch>
         </p:blipFill>
         <p:spPr>
           <a:xfrm>
-            <a:off x="2540540" y="1824590"/>
-            <a:ext cx="7110919" cy="4352373"/>
+            <a:off x="0" y="5455920"/>
+            <a:ext cx="2964514" cy="1402079"/>
           </a:xfrm>
           <a:prstGeom prst="rect">
             <a:avLst/>
@@ -4762,247 +4965,44 @@
         </p:spPr>
       </p:pic>
     </p:spTree>
-    <p:extLst>
-      <p:ext uri="{BB962C8B-B14F-4D97-AF65-F5344CB8AC3E}">
-        <p14:creationId xmlns:p14="http://schemas.microsoft.com/office/powerpoint/2010/main" val="1165448118"/>
-      </p:ext>
-    </p:extLst>
   </p:cSld>
   <p:clrMapOvr>
     <a:masterClrMapping/>
   </p:clrMapOvr>
+  <p:transition>
+    <p:wipe dir="r"/>
+  </p:transition>
+  <p:timing>
+    <p:tnLst>
+      <p:par>
+        <p:cTn id="1" dur="indefinite" restart="never" nodeType="tmRoot">
+          <p:childTnLst>
+            <p:seq>
+              <p:cTn id="2" dur="indefinite" nodeType="mainSeq"/>
+              <p:prevCondLst>
+                <p:cond evt="onPrev" delay="0">
+                  <p:tgtEl>
+                    <p:sldTgt/>
+                  </p:tgtEl>
+                </p:cond>
+              </p:prevCondLst>
+              <p:nextCondLst>
+                <p:cond evt="onNext" delay="0">
+                  <p:tgtEl>
+                    <p:sldTgt/>
+                  </p:tgtEl>
+                </p:cond>
+              </p:nextCondLst>
+            </p:seq>
+          </p:childTnLst>
+        </p:cTn>
+      </p:par>
+    </p:tnLst>
+  </p:timing>
 </p:sld>
 </file>
 
 <file path=ppt/slides/slide12.xml><?xml version="1.0" encoding="utf-8"?>
-<p:sld xmlns:a="http://schemas.openxmlformats.org/drawingml/2006/main" xmlns:r="http://schemas.openxmlformats.org/officeDocument/2006/relationships" xmlns:p="http://schemas.openxmlformats.org/presentationml/2006/main">
-  <p:cSld>
-    <p:spTree>
-      <p:nvGrpSpPr>
-        <p:cNvPr id="1" name=""/>
-        <p:cNvGrpSpPr/>
-        <p:nvPr/>
-      </p:nvGrpSpPr>
-      <p:grpSpPr>
-        <a:xfrm>
-          <a:off x="0" y="0"/>
-          <a:ext cx="0" cy="0"/>
-          <a:chOff x="0" y="0"/>
-          <a:chExt cx="0" cy="0"/>
-        </a:xfrm>
-      </p:grpSpPr>
-      <p:sp>
-        <p:nvSpPr>
-          <p:cNvPr id="2" name="Title 1">
-            <a:extLst>
-              <a:ext uri="{FF2B5EF4-FFF2-40B4-BE49-F238E27FC236}">
-                <a16:creationId xmlns:a16="http://schemas.microsoft.com/office/drawing/2014/main" id="{DC105FB6-9FE3-4434-AD43-3D59D7B132BE}"/>
-              </a:ext>
-            </a:extLst>
-          </p:cNvPr>
-          <p:cNvSpPr>
-            <a:spLocks noGrp="1"/>
-          </p:cNvSpPr>
-          <p:nvPr>
-            <p:ph type="title"/>
-          </p:nvPr>
-        </p:nvSpPr>
-        <p:spPr/>
-        <p:txBody>
-          <a:bodyPr/>
-          <a:lstStyle/>
-          <a:p>
-            <a:pPr algn="ctr"/>
-            <a:r>
-              <a:rPr lang="en-US" dirty="0"/>
-              <a:t>RStudio	</a:t>
-            </a:r>
-          </a:p>
-        </p:txBody>
-      </p:sp>
-      <p:sp>
-        <p:nvSpPr>
-          <p:cNvPr id="3" name="Content Placeholder 2">
-            <a:extLst>
-              <a:ext uri="{FF2B5EF4-FFF2-40B4-BE49-F238E27FC236}">
-                <a16:creationId xmlns:a16="http://schemas.microsoft.com/office/drawing/2014/main" id="{1D2CD88F-A139-4441-96D5-ECB80BA49CA0}"/>
-              </a:ext>
-            </a:extLst>
-          </p:cNvPr>
-          <p:cNvSpPr>
-            <a:spLocks noGrp="1"/>
-          </p:cNvSpPr>
-          <p:nvPr>
-            <p:ph idx="1"/>
-          </p:nvPr>
-        </p:nvSpPr>
-        <p:spPr/>
-        <p:txBody>
-          <a:bodyPr/>
-          <a:lstStyle/>
-          <a:p>
-            <a:endParaRPr lang="en-US"/>
-          </a:p>
-        </p:txBody>
-      </p:sp>
-      <p:pic>
-        <p:nvPicPr>
-          <p:cNvPr id="8" name="Picture 7">
-            <a:extLst>
-              <a:ext uri="{FF2B5EF4-FFF2-40B4-BE49-F238E27FC236}">
-                <a16:creationId xmlns:a16="http://schemas.microsoft.com/office/drawing/2014/main" id="{072A9A78-50C7-45ED-A9A7-9515C0C41C8A}"/>
-              </a:ext>
-            </a:extLst>
-          </p:cNvPr>
-          <p:cNvPicPr>
-            <a:picLocks noChangeAspect="1"/>
-          </p:cNvPicPr>
-          <p:nvPr/>
-        </p:nvPicPr>
-        <p:blipFill>
-          <a:blip r:embed="rId2"/>
-          <a:stretch>
-            <a:fillRect/>
-          </a:stretch>
-        </p:blipFill>
-        <p:spPr>
-          <a:xfrm>
-            <a:off x="2523087" y="1825625"/>
-            <a:ext cx="7145826" cy="4351338"/>
-          </a:xfrm>
-          <a:prstGeom prst="rect">
-            <a:avLst/>
-          </a:prstGeom>
-        </p:spPr>
-      </p:pic>
-    </p:spTree>
-    <p:extLst>
-      <p:ext uri="{BB962C8B-B14F-4D97-AF65-F5344CB8AC3E}">
-        <p14:creationId xmlns:p14="http://schemas.microsoft.com/office/powerpoint/2010/main" val="134838939"/>
-      </p:ext>
-    </p:extLst>
-  </p:cSld>
-  <p:clrMapOvr>
-    <a:masterClrMapping/>
-  </p:clrMapOvr>
-</p:sld>
-</file>
-
-<file path=ppt/slides/slide13.xml><?xml version="1.0" encoding="utf-8"?>
-<p:sld xmlns:a="http://schemas.openxmlformats.org/drawingml/2006/main" xmlns:r="http://schemas.openxmlformats.org/officeDocument/2006/relationships" xmlns:p="http://schemas.openxmlformats.org/presentationml/2006/main">
-  <p:cSld>
-    <p:spTree>
-      <p:nvGrpSpPr>
-        <p:cNvPr id="1" name=""/>
-        <p:cNvGrpSpPr/>
-        <p:nvPr/>
-      </p:nvGrpSpPr>
-      <p:grpSpPr>
-        <a:xfrm>
-          <a:off x="0" y="0"/>
-          <a:ext cx="0" cy="0"/>
-          <a:chOff x="0" y="0"/>
-          <a:chExt cx="0" cy="0"/>
-        </a:xfrm>
-      </p:grpSpPr>
-      <p:sp>
-        <p:nvSpPr>
-          <p:cNvPr id="2" name="Title 1">
-            <a:extLst>
-              <a:ext uri="{FF2B5EF4-FFF2-40B4-BE49-F238E27FC236}">
-                <a16:creationId xmlns:a16="http://schemas.microsoft.com/office/drawing/2014/main" id="{DC105FB6-9FE3-4434-AD43-3D59D7B132BE}"/>
-              </a:ext>
-            </a:extLst>
-          </p:cNvPr>
-          <p:cNvSpPr>
-            <a:spLocks noGrp="1"/>
-          </p:cNvSpPr>
-          <p:nvPr>
-            <p:ph type="title"/>
-          </p:nvPr>
-        </p:nvSpPr>
-        <p:spPr/>
-        <p:txBody>
-          <a:bodyPr/>
-          <a:lstStyle/>
-          <a:p>
-            <a:pPr algn="ctr"/>
-            <a:r>
-              <a:rPr lang="en-US" dirty="0"/>
-              <a:t>RStudio	</a:t>
-            </a:r>
-          </a:p>
-        </p:txBody>
-      </p:sp>
-      <p:sp>
-        <p:nvSpPr>
-          <p:cNvPr id="3" name="Content Placeholder 2">
-            <a:extLst>
-              <a:ext uri="{FF2B5EF4-FFF2-40B4-BE49-F238E27FC236}">
-                <a16:creationId xmlns:a16="http://schemas.microsoft.com/office/drawing/2014/main" id="{1D2CD88F-A139-4441-96D5-ECB80BA49CA0}"/>
-              </a:ext>
-            </a:extLst>
-          </p:cNvPr>
-          <p:cNvSpPr>
-            <a:spLocks noGrp="1"/>
-          </p:cNvSpPr>
-          <p:nvPr>
-            <p:ph idx="1"/>
-          </p:nvPr>
-        </p:nvSpPr>
-        <p:spPr/>
-        <p:txBody>
-          <a:bodyPr/>
-          <a:lstStyle/>
-          <a:p>
-            <a:endParaRPr lang="en-US"/>
-          </a:p>
-        </p:txBody>
-      </p:sp>
-      <p:pic>
-        <p:nvPicPr>
-          <p:cNvPr id="5" name="Picture 4">
-            <a:extLst>
-              <a:ext uri="{FF2B5EF4-FFF2-40B4-BE49-F238E27FC236}">
-                <a16:creationId xmlns:a16="http://schemas.microsoft.com/office/drawing/2014/main" id="{697922F3-B3D0-41E7-9A70-2FC33FA1E7C3}"/>
-              </a:ext>
-            </a:extLst>
-          </p:cNvPr>
-          <p:cNvPicPr>
-            <a:picLocks noChangeAspect="1"/>
-          </p:cNvPicPr>
-          <p:nvPr/>
-        </p:nvPicPr>
-        <p:blipFill>
-          <a:blip r:embed="rId2"/>
-          <a:stretch>
-            <a:fillRect/>
-          </a:stretch>
-        </p:blipFill>
-        <p:spPr>
-          <a:xfrm>
-            <a:off x="2523086" y="1825625"/>
-            <a:ext cx="7145827" cy="4351338"/>
-          </a:xfrm>
-          <a:prstGeom prst="rect">
-            <a:avLst/>
-          </a:prstGeom>
-        </p:spPr>
-      </p:pic>
-    </p:spTree>
-    <p:extLst>
-      <p:ext uri="{BB962C8B-B14F-4D97-AF65-F5344CB8AC3E}">
-        <p14:creationId xmlns:p14="http://schemas.microsoft.com/office/powerpoint/2010/main" val="3764865403"/>
-      </p:ext>
-    </p:extLst>
-  </p:cSld>
-  <p:clrMapOvr>
-    <a:masterClrMapping/>
-  </p:clrMapOvr>
-</p:sld>
-</file>
-
-<file path=ppt/slides/slide14.xml><?xml version="1.0" encoding="utf-8"?>
 <p:sld xmlns:a="http://schemas.openxmlformats.org/drawingml/2006/main" xmlns:r="http://schemas.openxmlformats.org/officeDocument/2006/relationships" xmlns:p="http://schemas.openxmlformats.org/presentationml/2006/main">
   <p:cSld>
     <p:spTree>
@@ -5219,19 +5219,19 @@
               <a:rPr lang="en-US" sz="3200" dirty="0">
                 <a:latin typeface="+mj-lt"/>
               </a:rPr>
-              <a:t>Setting up </a:t>
+              <a:t>Setting up Google </a:t>
             </a:r>
             <a:r>
               <a:rPr lang="en-US" sz="3200" dirty="0" err="1">
                 <a:latin typeface="+mj-lt"/>
               </a:rPr>
-              <a:t>Jupyter</a:t>
+              <a:t>Colab</a:t>
             </a:r>
             <a:r>
               <a:rPr lang="en-US" sz="3200" dirty="0">
                 <a:latin typeface="+mj-lt"/>
               </a:rPr>
-              <a:t> and Anaconda Environments</a:t>
+              <a:t> and coding environments</a:t>
             </a:r>
           </a:p>
           <a:p>
@@ -5274,6 +5274,14 @@
 <file path=ppt/slides/slide3.xml><?xml version="1.0" encoding="utf-8"?>
 <p:sld xmlns:a="http://schemas.openxmlformats.org/drawingml/2006/main" xmlns:r="http://schemas.openxmlformats.org/officeDocument/2006/relationships" xmlns:p="http://schemas.openxmlformats.org/presentationml/2006/main">
   <p:cSld>
+    <p:bg>
+      <p:bgPr>
+        <a:solidFill>
+          <a:schemeClr val="bg1"/>
+        </a:solidFill>
+        <a:effectLst/>
+      </p:bgPr>
+    </p:bg>
     <p:spTree>
       <p:nvGrpSpPr>
         <p:cNvPr id="1" name=""/>
@@ -5288,6 +5296,66 @@
           <a:chExt cx="0" cy="0"/>
         </a:xfrm>
       </p:grpSpPr>
+      <p:sp useBgFill="1">
+        <p:nvSpPr>
+          <p:cNvPr id="10" name="Slide Background">
+            <a:extLst>
+              <a:ext uri="{FF2B5EF4-FFF2-40B4-BE49-F238E27FC236}">
+                <a16:creationId xmlns:a16="http://schemas.microsoft.com/office/drawing/2014/main" id="{9F7D5CDA-D291-4307-BF55-1381FED29634}"/>
+              </a:ext>
+              <a:ext uri="{C183D7F6-B498-43B3-948B-1728B52AA6E4}">
+                <adec:decorative xmlns:adec="http://schemas.microsoft.com/office/drawing/2017/decorative" val="1"/>
+              </a:ext>
+            </a:extLst>
+          </p:cNvPr>
+          <p:cNvSpPr>
+            <a:spLocks noGrp="1" noRot="1" noChangeAspect="1" noMove="1" noResize="1" noEditPoints="1" noAdjustHandles="1" noChangeArrowheads="1" noChangeShapeType="1" noTextEdit="1"/>
+          </p:cNvSpPr>
+          <p:nvPr>
+            <p:extLst>
+              <p:ext uri="{386F3935-93C4-4BCD-93E2-E3B085C9AB24}">
+                <p16:designElem xmlns:p16="http://schemas.microsoft.com/office/powerpoint/2015/main" val="1"/>
+              </p:ext>
+            </p:extLst>
+          </p:nvPr>
+        </p:nvSpPr>
+        <p:spPr>
+          <a:xfrm>
+            <a:off x="0" y="0"/>
+            <a:ext cx="12192000" cy="6858000"/>
+          </a:xfrm>
+          <a:prstGeom prst="rect">
+            <a:avLst/>
+          </a:prstGeom>
+          <a:ln>
+            <a:noFill/>
+          </a:ln>
+        </p:spPr>
+        <p:style>
+          <a:lnRef idx="2">
+            <a:schemeClr val="accent1">
+              <a:shade val="50000"/>
+            </a:schemeClr>
+          </a:lnRef>
+          <a:fillRef idx="1">
+            <a:schemeClr val="accent1"/>
+          </a:fillRef>
+          <a:effectRef idx="0">
+            <a:schemeClr val="accent1"/>
+          </a:effectRef>
+          <a:fontRef idx="minor">
+            <a:schemeClr val="lt1"/>
+          </a:fontRef>
+        </p:style>
+        <p:txBody>
+          <a:bodyPr rtlCol="0" anchor="ctr"/>
+          <a:lstStyle/>
+          <a:p>
+            <a:pPr algn="ctr"/>
+            <a:endParaRPr lang="en-US"/>
+          </a:p>
+        </p:txBody>
+      </p:sp>
       <p:sp>
         <p:nvSpPr>
           <p:cNvPr id="2" name="Title 1">
@@ -5304,13 +5372,20 @@
             <p:ph type="title"/>
           </p:nvPr>
         </p:nvSpPr>
-        <p:spPr/>
-        <p:txBody>
-          <a:bodyPr/>
-          <a:lstStyle/>
-          <a:p>
-            <a:r>
-              <a:rPr lang="en-US" dirty="0"/>
+        <p:spPr>
+          <a:xfrm>
+            <a:off x="761800" y="762001"/>
+            <a:ext cx="5334197" cy="1708242"/>
+          </a:xfrm>
+        </p:spPr>
+        <p:txBody>
+          <a:bodyPr anchor="ctr">
+            <a:normAutofit/>
+          </a:bodyPr>
+          <a:lstStyle/>
+          <a:p>
+            <a:r>
+              <a:rPr lang="en-US" sz="4000"/>
               <a:t>Data is valuable</a:t>
             </a:r>
           </a:p>
@@ -5332,13 +5407,20 @@
             <p:ph idx="1"/>
           </p:nvPr>
         </p:nvSpPr>
-        <p:spPr/>
-        <p:txBody>
-          <a:bodyPr/>
-          <a:lstStyle/>
-          <a:p>
-            <a:r>
-              <a:rPr lang="en-US" dirty="0">
+        <p:spPr>
+          <a:xfrm>
+            <a:off x="761800" y="2470244"/>
+            <a:ext cx="5334197" cy="3769835"/>
+          </a:xfrm>
+        </p:spPr>
+        <p:txBody>
+          <a:bodyPr anchor="ctr">
+            <a:normAutofit/>
+          </a:bodyPr>
+          <a:lstStyle/>
+          <a:p>
+            <a:r>
+              <a:rPr lang="en-US" sz="2000" dirty="0">
                 <a:latin typeface="+mj-lt"/>
               </a:rPr>
               <a:t>Great effort is put in to collect data systematically </a:t>
@@ -5346,7 +5428,7 @@
           </a:p>
           <a:p>
             <a:r>
-              <a:rPr lang="en-US" dirty="0">
+              <a:rPr lang="en-US" sz="2000" dirty="0">
                 <a:latin typeface="+mj-lt"/>
               </a:rPr>
               <a:t>Hard work, meticulous planning, and recourses are put in to collect the data</a:t>
@@ -5354,6 +5436,50 @@
           </a:p>
         </p:txBody>
       </p:sp>
+      <p:pic>
+        <p:nvPicPr>
+          <p:cNvPr id="5" name="Picture 4" descr="A group of people in the jungle&#10;&#10;AI-generated content may be incorrect.">
+            <a:extLst>
+              <a:ext uri="{FF2B5EF4-FFF2-40B4-BE49-F238E27FC236}">
+                <a16:creationId xmlns:a16="http://schemas.microsoft.com/office/drawing/2014/main" id="{D4129556-71E5-58FE-B885-E03910DFD3D2}"/>
+              </a:ext>
+            </a:extLst>
+          </p:cNvPr>
+          <p:cNvPicPr>
+            <a:picLocks noChangeAspect="1"/>
+          </p:cNvPicPr>
+          <p:nvPr/>
+        </p:nvPicPr>
+        <p:blipFill>
+          <a:blip r:embed="rId2">
+            <a:extLst>
+              <a:ext uri="{28A0092B-C50C-407E-A947-70E740481C1C}">
+                <a14:useLocalDpi xmlns:a14="http://schemas.microsoft.com/office/drawing/2010/main" val="0"/>
+              </a:ext>
+            </a:extLst>
+          </a:blip>
+          <a:srcRect l="14668" r="7674" b="-1"/>
+          <a:stretch>
+            <a:fillRect/>
+          </a:stretch>
+        </p:blipFill>
+        <p:spPr>
+          <a:xfrm>
+            <a:off x="6857797" y="-10886"/>
+            <a:ext cx="5334204" cy="6868886"/>
+          </a:xfrm>
+          <a:prstGeom prst="rect">
+            <a:avLst/>
+          </a:prstGeom>
+          <a:effectLst>
+            <a:outerShdw blurRad="127000" dist="50800" dir="10800000" sx="99000" sy="99000" algn="r" rotWithShape="0">
+              <a:prstClr val="black">
+                <a:alpha val="40000"/>
+              </a:prstClr>
+            </a:outerShdw>
+          </a:effectLst>
+        </p:spPr>
+      </p:pic>
     </p:spTree>
     <p:extLst>
       <p:ext uri="{BB962C8B-B14F-4D97-AF65-F5344CB8AC3E}">
@@ -5455,6 +5581,66 @@
           </a:p>
         </p:txBody>
       </p:sp>
+      <p:pic>
+        <p:nvPicPr>
+          <p:cNvPr id="4" name="Picture 3">
+            <a:extLst>
+              <a:ext uri="{FF2B5EF4-FFF2-40B4-BE49-F238E27FC236}">
+                <a16:creationId xmlns:a16="http://schemas.microsoft.com/office/drawing/2014/main" id="{D687F0E4-3A38-E095-988E-9C5169265D7C}"/>
+              </a:ext>
+            </a:extLst>
+          </p:cNvPr>
+          <p:cNvPicPr>
+            <a:picLocks noChangeAspect="1"/>
+          </p:cNvPicPr>
+          <p:nvPr/>
+        </p:nvPicPr>
+        <p:blipFill>
+          <a:blip r:embed="rId2"/>
+          <a:stretch>
+            <a:fillRect/>
+          </a:stretch>
+        </p:blipFill>
+        <p:spPr>
+          <a:xfrm>
+            <a:off x="6672091" y="650494"/>
+            <a:ext cx="4259312" cy="5324142"/>
+          </a:xfrm>
+          <a:prstGeom prst="rect">
+            <a:avLst/>
+          </a:prstGeom>
+        </p:spPr>
+      </p:pic>
+      <p:pic>
+        <p:nvPicPr>
+          <p:cNvPr id="6" name="Picture 5">
+            <a:extLst>
+              <a:ext uri="{FF2B5EF4-FFF2-40B4-BE49-F238E27FC236}">
+                <a16:creationId xmlns:a16="http://schemas.microsoft.com/office/drawing/2014/main" id="{5733FDC9-6FA9-81C6-C53F-BFDA515F685D}"/>
+              </a:ext>
+            </a:extLst>
+          </p:cNvPr>
+          <p:cNvPicPr>
+            <a:picLocks noChangeAspect="1"/>
+          </p:cNvPicPr>
+          <p:nvPr/>
+        </p:nvPicPr>
+        <p:blipFill>
+          <a:blip r:embed="rId3"/>
+          <a:stretch>
+            <a:fillRect/>
+          </a:stretch>
+        </p:blipFill>
+        <p:spPr>
+          <a:xfrm>
+            <a:off x="0" y="4843540"/>
+            <a:ext cx="4259312" cy="2014459"/>
+          </a:xfrm>
+          <a:prstGeom prst="rect">
+            <a:avLst/>
+          </a:prstGeom>
+        </p:spPr>
+      </p:pic>
     </p:spTree>
     <p:extLst>
       <p:ext uri="{BB962C8B-B14F-4D97-AF65-F5344CB8AC3E}">
@@ -5490,589 +5676,6 @@
           <p:cNvPr id="2" name="Title 1">
             <a:extLst>
               <a:ext uri="{FF2B5EF4-FFF2-40B4-BE49-F238E27FC236}">
-                <a16:creationId xmlns:a16="http://schemas.microsoft.com/office/drawing/2014/main" id="{1EB7E290-485D-4224-AC1D-53C1F6B0B9C7}"/>
-              </a:ext>
-            </a:extLst>
-          </p:cNvPr>
-          <p:cNvSpPr>
-            <a:spLocks noGrp="1"/>
-          </p:cNvSpPr>
-          <p:nvPr>
-            <p:ph type="title"/>
-          </p:nvPr>
-        </p:nvSpPr>
-        <p:spPr/>
-        <p:txBody>
-          <a:bodyPr/>
-          <a:lstStyle/>
-          <a:p>
-            <a:r>
-              <a:rPr lang="en-US" dirty="0"/>
-              <a:t>Collaborate effectively</a:t>
-            </a:r>
-          </a:p>
-        </p:txBody>
-      </p:sp>
-      <p:pic>
-        <p:nvPicPr>
-          <p:cNvPr id="5" name="Content Placeholder 4" descr="Shape&#10;&#10;Description automatically generated with low confidence">
-            <a:extLst>
-              <a:ext uri="{FF2B5EF4-FFF2-40B4-BE49-F238E27FC236}">
-                <a16:creationId xmlns:a16="http://schemas.microsoft.com/office/drawing/2014/main" id="{96AC1CEB-E766-4AAD-92A0-9B7C1EF012F2}"/>
-              </a:ext>
-            </a:extLst>
-          </p:cNvPr>
-          <p:cNvPicPr>
-            <a:picLocks noGrp="1" noChangeAspect="1"/>
-          </p:cNvPicPr>
-          <p:nvPr>
-            <p:ph idx="1"/>
-          </p:nvPr>
-        </p:nvPicPr>
-        <p:blipFill>
-          <a:blip r:embed="rId2">
-            <a:extLst>
-              <a:ext uri="{28A0092B-C50C-407E-A947-70E740481C1C}">
-                <a14:useLocalDpi xmlns:a14="http://schemas.microsoft.com/office/drawing/2010/main" val="0"/>
-              </a:ext>
-            </a:extLst>
-          </a:blip>
-          <a:stretch>
-            <a:fillRect/>
-          </a:stretch>
-        </p:blipFill>
-        <p:spPr>
-          <a:xfrm>
-            <a:off x="1017895" y="1690688"/>
-            <a:ext cx="2116080" cy="4351338"/>
-          </a:xfrm>
-        </p:spPr>
-      </p:pic>
-      <p:sp>
-        <p:nvSpPr>
-          <p:cNvPr id="6" name="TextBox 5">
-            <a:extLst>
-              <a:ext uri="{FF2B5EF4-FFF2-40B4-BE49-F238E27FC236}">
-                <a16:creationId xmlns:a16="http://schemas.microsoft.com/office/drawing/2014/main" id="{EDF07E62-33B6-443E-A467-A9AC77AE690A}"/>
-              </a:ext>
-            </a:extLst>
-          </p:cNvPr>
-          <p:cNvSpPr txBox="1"/>
-          <p:nvPr/>
-        </p:nvSpPr>
-        <p:spPr>
-          <a:xfrm>
-            <a:off x="1138136" y="6042026"/>
-            <a:ext cx="1995839" cy="369332"/>
-          </a:xfrm>
-          <a:prstGeom prst="rect">
-            <a:avLst/>
-          </a:prstGeom>
-          <a:noFill/>
-        </p:spPr>
-        <p:txBody>
-          <a:bodyPr wrap="square" rtlCol="0">
-            <a:spAutoFit/>
-          </a:bodyPr>
-          <a:lstStyle/>
-          <a:p>
-            <a:pPr algn="ctr"/>
-            <a:r>
-              <a:rPr lang="en-US" dirty="0">
-                <a:latin typeface="+mj-lt"/>
-              </a:rPr>
-              <a:t>You</a:t>
-            </a:r>
-          </a:p>
-        </p:txBody>
-      </p:sp>
-      <p:pic>
-        <p:nvPicPr>
-          <p:cNvPr id="7" name="Content Placeholder 4" descr="Shape&#10;&#10;Description automatically generated with low confidence">
-            <a:extLst>
-              <a:ext uri="{FF2B5EF4-FFF2-40B4-BE49-F238E27FC236}">
-                <a16:creationId xmlns:a16="http://schemas.microsoft.com/office/drawing/2014/main" id="{48BE4569-0835-41B3-B3B7-659D27DF0446}"/>
-              </a:ext>
-            </a:extLst>
-          </p:cNvPr>
-          <p:cNvPicPr>
-            <a:picLocks noChangeAspect="1"/>
-          </p:cNvPicPr>
-          <p:nvPr/>
-        </p:nvPicPr>
-        <p:blipFill>
-          <a:blip r:embed="rId2">
-            <a:extLst>
-              <a:ext uri="{28A0092B-C50C-407E-A947-70E740481C1C}">
-                <a14:useLocalDpi xmlns:a14="http://schemas.microsoft.com/office/drawing/2010/main" val="0"/>
-              </a:ext>
-            </a:extLst>
-          </a:blip>
-          <a:stretch>
-            <a:fillRect/>
-          </a:stretch>
-        </p:blipFill>
-        <p:spPr>
-          <a:xfrm>
-            <a:off x="5148648" y="1748353"/>
-            <a:ext cx="1070397" cy="2201079"/>
-          </a:xfrm>
-          <a:prstGeom prst="rect">
-            <a:avLst/>
-          </a:prstGeom>
-        </p:spPr>
-      </p:pic>
-      <p:pic>
-        <p:nvPicPr>
-          <p:cNvPr id="8" name="Content Placeholder 4" descr="Shape&#10;&#10;Description automatically generated with low confidence">
-            <a:extLst>
-              <a:ext uri="{FF2B5EF4-FFF2-40B4-BE49-F238E27FC236}">
-                <a16:creationId xmlns:a16="http://schemas.microsoft.com/office/drawing/2014/main" id="{4518326D-C277-43E9-AEB7-E512A891D176}"/>
-              </a:ext>
-            </a:extLst>
-          </p:cNvPr>
-          <p:cNvPicPr>
-            <a:picLocks noChangeAspect="1"/>
-          </p:cNvPicPr>
-          <p:nvPr/>
-        </p:nvPicPr>
-        <p:blipFill>
-          <a:blip r:embed="rId2">
-            <a:extLst>
-              <a:ext uri="{28A0092B-C50C-407E-A947-70E740481C1C}">
-                <a14:useLocalDpi xmlns:a14="http://schemas.microsoft.com/office/drawing/2010/main" val="0"/>
-              </a:ext>
-            </a:extLst>
-          </a:blip>
-          <a:stretch>
-            <a:fillRect/>
-          </a:stretch>
-        </p:blipFill>
-        <p:spPr>
-          <a:xfrm>
-            <a:off x="5622324" y="2125776"/>
-            <a:ext cx="1070397" cy="2201079"/>
-          </a:xfrm>
-          <a:prstGeom prst="rect">
-            <a:avLst/>
-          </a:prstGeom>
-        </p:spPr>
-      </p:pic>
-      <p:pic>
-        <p:nvPicPr>
-          <p:cNvPr id="9" name="Content Placeholder 4" descr="Shape&#10;&#10;Description automatically generated with low confidence">
-            <a:extLst>
-              <a:ext uri="{FF2B5EF4-FFF2-40B4-BE49-F238E27FC236}">
-                <a16:creationId xmlns:a16="http://schemas.microsoft.com/office/drawing/2014/main" id="{10535E39-2D7A-4916-9994-FF8B7F6B6C1C}"/>
-              </a:ext>
-            </a:extLst>
-          </p:cNvPr>
-          <p:cNvPicPr>
-            <a:picLocks noChangeAspect="1"/>
-          </p:cNvPicPr>
-          <p:nvPr/>
-        </p:nvPicPr>
-        <p:blipFill>
-          <a:blip r:embed="rId2">
-            <a:extLst>
-              <a:ext uri="{28A0092B-C50C-407E-A947-70E740481C1C}">
-                <a14:useLocalDpi xmlns:a14="http://schemas.microsoft.com/office/drawing/2010/main" val="0"/>
-              </a:ext>
-            </a:extLst>
-          </a:blip>
-          <a:stretch>
-            <a:fillRect/>
-          </a:stretch>
-        </p:blipFill>
-        <p:spPr>
-          <a:xfrm>
-            <a:off x="6096000" y="1464148"/>
-            <a:ext cx="1070397" cy="2201079"/>
-          </a:xfrm>
-          <a:prstGeom prst="rect">
-            <a:avLst/>
-          </a:prstGeom>
-        </p:spPr>
-      </p:pic>
-      <p:sp>
-        <p:nvSpPr>
-          <p:cNvPr id="10" name="TextBox 9">
-            <a:extLst>
-              <a:ext uri="{FF2B5EF4-FFF2-40B4-BE49-F238E27FC236}">
-                <a16:creationId xmlns:a16="http://schemas.microsoft.com/office/drawing/2014/main" id="{A070C7FD-B5F3-4335-B310-075EF8C1EFD4}"/>
-              </a:ext>
-            </a:extLst>
-          </p:cNvPr>
-          <p:cNvSpPr txBox="1"/>
-          <p:nvPr/>
-        </p:nvSpPr>
-        <p:spPr>
-          <a:xfrm>
-            <a:off x="5098080" y="4334946"/>
-            <a:ext cx="1995839" cy="369332"/>
-          </a:xfrm>
-          <a:prstGeom prst="rect">
-            <a:avLst/>
-          </a:prstGeom>
-          <a:noFill/>
-        </p:spPr>
-        <p:txBody>
-          <a:bodyPr wrap="square" rtlCol="0">
-            <a:spAutoFit/>
-          </a:bodyPr>
-          <a:lstStyle/>
-          <a:p>
-            <a:pPr algn="ctr"/>
-            <a:r>
-              <a:rPr lang="en-US" dirty="0">
-                <a:latin typeface="+mj-lt"/>
-              </a:rPr>
-              <a:t>Colleagues</a:t>
-            </a:r>
-          </a:p>
-        </p:txBody>
-      </p:sp>
-      <p:pic>
-        <p:nvPicPr>
-          <p:cNvPr id="11" name="Content Placeholder 4" descr="Shape&#10;&#10;Description automatically generated with low confidence">
-            <a:extLst>
-              <a:ext uri="{FF2B5EF4-FFF2-40B4-BE49-F238E27FC236}">
-                <a16:creationId xmlns:a16="http://schemas.microsoft.com/office/drawing/2014/main" id="{256AC732-DD99-4747-9006-A7B16BFEC3D1}"/>
-              </a:ext>
-            </a:extLst>
-          </p:cNvPr>
-          <p:cNvPicPr>
-            <a:picLocks noChangeAspect="1"/>
-          </p:cNvPicPr>
-          <p:nvPr/>
-        </p:nvPicPr>
-        <p:blipFill>
-          <a:blip r:embed="rId2">
-            <a:extLst>
-              <a:ext uri="{28A0092B-C50C-407E-A947-70E740481C1C}">
-                <a14:useLocalDpi xmlns:a14="http://schemas.microsoft.com/office/drawing/2010/main" val="0"/>
-              </a:ext>
-            </a:extLst>
-          </a:blip>
-          <a:stretch>
-            <a:fillRect/>
-          </a:stretch>
-        </p:blipFill>
-        <p:spPr>
-          <a:xfrm>
-            <a:off x="8402451" y="1716098"/>
-            <a:ext cx="2116080" cy="4351338"/>
-          </a:xfrm>
-          <a:prstGeom prst="rect">
-            <a:avLst/>
-          </a:prstGeom>
-        </p:spPr>
-      </p:pic>
-      <p:sp>
-        <p:nvSpPr>
-          <p:cNvPr id="12" name="TextBox 11">
-            <a:extLst>
-              <a:ext uri="{FF2B5EF4-FFF2-40B4-BE49-F238E27FC236}">
-                <a16:creationId xmlns:a16="http://schemas.microsoft.com/office/drawing/2014/main" id="{45F1396D-2168-4973-8C1A-C8DB7812D3CE}"/>
-              </a:ext>
-            </a:extLst>
-          </p:cNvPr>
-          <p:cNvSpPr txBox="1"/>
-          <p:nvPr/>
-        </p:nvSpPr>
-        <p:spPr>
-          <a:xfrm>
-            <a:off x="8402451" y="6042026"/>
-            <a:ext cx="1995839" cy="369332"/>
-          </a:xfrm>
-          <a:prstGeom prst="rect">
-            <a:avLst/>
-          </a:prstGeom>
-          <a:noFill/>
-        </p:spPr>
-        <p:txBody>
-          <a:bodyPr wrap="square" rtlCol="0">
-            <a:spAutoFit/>
-          </a:bodyPr>
-          <a:lstStyle/>
-          <a:p>
-            <a:pPr algn="ctr"/>
-            <a:r>
-              <a:rPr lang="en-US" dirty="0">
-                <a:latin typeface="+mj-lt"/>
-              </a:rPr>
-              <a:t>Future you</a:t>
-            </a:r>
-          </a:p>
-        </p:txBody>
-      </p:sp>
-    </p:spTree>
-    <p:extLst>
-      <p:ext uri="{BB962C8B-B14F-4D97-AF65-F5344CB8AC3E}">
-        <p14:creationId xmlns:p14="http://schemas.microsoft.com/office/powerpoint/2010/main" val="2242584392"/>
-      </p:ext>
-    </p:extLst>
-  </p:cSld>
-  <p:clrMapOvr>
-    <a:masterClrMapping/>
-  </p:clrMapOvr>
-  <p:timing>
-    <p:tnLst>
-      <p:par>
-        <p:cTn id="1" dur="indefinite" restart="never" nodeType="tmRoot">
-          <p:childTnLst>
-            <p:seq concurrent="1" nextAc="seek">
-              <p:cTn id="2" dur="indefinite" nodeType="mainSeq">
-                <p:childTnLst>
-                  <p:par>
-                    <p:cTn id="3" fill="hold">
-                      <p:stCondLst>
-                        <p:cond delay="indefinite"/>
-                      </p:stCondLst>
-                      <p:childTnLst>
-                        <p:par>
-                          <p:cTn id="4" fill="hold">
-                            <p:stCondLst>
-                              <p:cond delay="0"/>
-                            </p:stCondLst>
-                            <p:childTnLst>
-                              <p:par>
-                                <p:cTn id="5" presetID="1" presetClass="entr" presetSubtype="0" fill="hold" nodeType="clickEffect">
-                                  <p:stCondLst>
-                                    <p:cond delay="0"/>
-                                  </p:stCondLst>
-                                  <p:childTnLst>
-                                    <p:set>
-                                      <p:cBhvr>
-                                        <p:cTn id="6" dur="1" fill="hold">
-                                          <p:stCondLst>
-                                            <p:cond delay="0"/>
-                                          </p:stCondLst>
-                                        </p:cTn>
-                                        <p:tgtEl>
-                                          <p:spTgt spid="7"/>
-                                        </p:tgtEl>
-                                        <p:attrNameLst>
-                                          <p:attrName>style.visibility</p:attrName>
-                                        </p:attrNameLst>
-                                      </p:cBhvr>
-                                      <p:to>
-                                        <p:strVal val="visible"/>
-                                      </p:to>
-                                    </p:set>
-                                  </p:childTnLst>
-                                </p:cTn>
-                              </p:par>
-                              <p:par>
-                                <p:cTn id="7" presetID="1" presetClass="entr" presetSubtype="0" fill="hold" nodeType="withEffect">
-                                  <p:stCondLst>
-                                    <p:cond delay="0"/>
-                                  </p:stCondLst>
-                                  <p:childTnLst>
-                                    <p:set>
-                                      <p:cBhvr>
-                                        <p:cTn id="8" dur="1" fill="hold">
-                                          <p:stCondLst>
-                                            <p:cond delay="0"/>
-                                          </p:stCondLst>
-                                        </p:cTn>
-                                        <p:tgtEl>
-                                          <p:spTgt spid="8"/>
-                                        </p:tgtEl>
-                                        <p:attrNameLst>
-                                          <p:attrName>style.visibility</p:attrName>
-                                        </p:attrNameLst>
-                                      </p:cBhvr>
-                                      <p:to>
-                                        <p:strVal val="visible"/>
-                                      </p:to>
-                                    </p:set>
-                                  </p:childTnLst>
-                                </p:cTn>
-                              </p:par>
-                              <p:par>
-                                <p:cTn id="9" presetID="1" presetClass="entr" presetSubtype="0" fill="hold" grpId="0" nodeType="withEffect">
-                                  <p:stCondLst>
-                                    <p:cond delay="0"/>
-                                  </p:stCondLst>
-                                  <p:childTnLst>
-                                    <p:set>
-                                      <p:cBhvr>
-                                        <p:cTn id="10" dur="1" fill="hold">
-                                          <p:stCondLst>
-                                            <p:cond delay="0"/>
-                                          </p:stCondLst>
-                                        </p:cTn>
-                                        <p:tgtEl>
-                                          <p:spTgt spid="10"/>
-                                        </p:tgtEl>
-                                        <p:attrNameLst>
-                                          <p:attrName>style.visibility</p:attrName>
-                                        </p:attrNameLst>
-                                      </p:cBhvr>
-                                      <p:to>
-                                        <p:strVal val="visible"/>
-                                      </p:to>
-                                    </p:set>
-                                  </p:childTnLst>
-                                </p:cTn>
-                              </p:par>
-                              <p:par>
-                                <p:cTn id="11" presetID="1" presetClass="entr" presetSubtype="0" fill="hold" nodeType="withEffect">
-                                  <p:stCondLst>
-                                    <p:cond delay="0"/>
-                                  </p:stCondLst>
-                                  <p:childTnLst>
-                                    <p:set>
-                                      <p:cBhvr>
-                                        <p:cTn id="12" dur="1" fill="hold">
-                                          <p:stCondLst>
-                                            <p:cond delay="0"/>
-                                          </p:stCondLst>
-                                        </p:cTn>
-                                        <p:tgtEl>
-                                          <p:spTgt spid="9"/>
-                                        </p:tgtEl>
-                                        <p:attrNameLst>
-                                          <p:attrName>style.visibility</p:attrName>
-                                        </p:attrNameLst>
-                                      </p:cBhvr>
-                                      <p:to>
-                                        <p:strVal val="visible"/>
-                                      </p:to>
-                                    </p:set>
-                                  </p:childTnLst>
-                                </p:cTn>
-                              </p:par>
-                            </p:childTnLst>
-                          </p:cTn>
-                        </p:par>
-                      </p:childTnLst>
-                    </p:cTn>
-                  </p:par>
-                  <p:par>
-                    <p:cTn id="13" fill="hold">
-                      <p:stCondLst>
-                        <p:cond delay="indefinite"/>
-                      </p:stCondLst>
-                      <p:childTnLst>
-                        <p:par>
-                          <p:cTn id="14" fill="hold">
-                            <p:stCondLst>
-                              <p:cond delay="0"/>
-                            </p:stCondLst>
-                            <p:childTnLst>
-                              <p:par>
-                                <p:cTn id="15" presetID="1" presetClass="entr" presetSubtype="0" fill="hold" nodeType="clickEffect">
-                                  <p:stCondLst>
-                                    <p:cond delay="0"/>
-                                  </p:stCondLst>
-                                  <p:childTnLst>
-                                    <p:set>
-                                      <p:cBhvr>
-                                        <p:cTn id="16" dur="1" fill="hold">
-                                          <p:stCondLst>
-                                            <p:cond delay="0"/>
-                                          </p:stCondLst>
-                                        </p:cTn>
-                                        <p:tgtEl>
-                                          <p:spTgt spid="11"/>
-                                        </p:tgtEl>
-                                        <p:attrNameLst>
-                                          <p:attrName>style.visibility</p:attrName>
-                                        </p:attrNameLst>
-                                      </p:cBhvr>
-                                      <p:to>
-                                        <p:strVal val="visible"/>
-                                      </p:to>
-                                    </p:set>
-                                  </p:childTnLst>
-                                </p:cTn>
-                              </p:par>
-                              <p:par>
-                                <p:cTn id="17" presetID="1" presetClass="entr" presetSubtype="0" fill="hold" grpId="0" nodeType="withEffect">
-                                  <p:stCondLst>
-                                    <p:cond delay="0"/>
-                                  </p:stCondLst>
-                                  <p:childTnLst>
-                                    <p:set>
-                                      <p:cBhvr>
-                                        <p:cTn id="18" dur="1" fill="hold">
-                                          <p:stCondLst>
-                                            <p:cond delay="0"/>
-                                          </p:stCondLst>
-                                        </p:cTn>
-                                        <p:tgtEl>
-                                          <p:spTgt spid="12"/>
-                                        </p:tgtEl>
-                                        <p:attrNameLst>
-                                          <p:attrName>style.visibility</p:attrName>
-                                        </p:attrNameLst>
-                                      </p:cBhvr>
-                                      <p:to>
-                                        <p:strVal val="visible"/>
-                                      </p:to>
-                                    </p:set>
-                                  </p:childTnLst>
-                                </p:cTn>
-                              </p:par>
-                            </p:childTnLst>
-                          </p:cTn>
-                        </p:par>
-                      </p:childTnLst>
-                    </p:cTn>
-                  </p:par>
-                </p:childTnLst>
-              </p:cTn>
-              <p:prevCondLst>
-                <p:cond evt="onPrev" delay="0">
-                  <p:tgtEl>
-                    <p:sldTgt/>
-                  </p:tgtEl>
-                </p:cond>
-              </p:prevCondLst>
-              <p:nextCondLst>
-                <p:cond evt="onNext" delay="0">
-                  <p:tgtEl>
-                    <p:sldTgt/>
-                  </p:tgtEl>
-                </p:cond>
-              </p:nextCondLst>
-            </p:seq>
-          </p:childTnLst>
-        </p:cTn>
-      </p:par>
-    </p:tnLst>
-    <p:bldLst>
-      <p:bldP spid="10" grpId="0"/>
-      <p:bldP spid="12" grpId="0"/>
-    </p:bldLst>
-  </p:timing>
-</p:sld>
-</file>
-
-<file path=ppt/slides/slide6.xml><?xml version="1.0" encoding="utf-8"?>
-<p:sld xmlns:a="http://schemas.openxmlformats.org/drawingml/2006/main" xmlns:r="http://schemas.openxmlformats.org/officeDocument/2006/relationships" xmlns:p="http://schemas.openxmlformats.org/presentationml/2006/main">
-  <p:cSld>
-    <p:spTree>
-      <p:nvGrpSpPr>
-        <p:cNvPr id="1" name=""/>
-        <p:cNvGrpSpPr/>
-        <p:nvPr/>
-      </p:nvGrpSpPr>
-      <p:grpSpPr>
-        <a:xfrm>
-          <a:off x="0" y="0"/>
-          <a:ext cx="0" cy="0"/>
-          <a:chOff x="0" y="0"/>
-          <a:chExt cx="0" cy="0"/>
-        </a:xfrm>
-      </p:grpSpPr>
-      <p:sp>
-        <p:nvSpPr>
-          <p:cNvPr id="2" name="Title 1">
-            <a:extLst>
-              <a:ext uri="{FF2B5EF4-FFF2-40B4-BE49-F238E27FC236}">
                 <a16:creationId xmlns:a16="http://schemas.microsoft.com/office/drawing/2014/main" id="{BDD5654F-F0B8-4114-9369-F1B185944659}"/>
               </a:ext>
             </a:extLst>
@@ -6183,6 +5786,36 @@
           </a:p>
         </p:txBody>
       </p:sp>
+      <p:pic>
+        <p:nvPicPr>
+          <p:cNvPr id="4" name="Picture 3">
+            <a:extLst>
+              <a:ext uri="{FF2B5EF4-FFF2-40B4-BE49-F238E27FC236}">
+                <a16:creationId xmlns:a16="http://schemas.microsoft.com/office/drawing/2014/main" id="{35FD0467-656D-F00F-CA39-FCD2240BC6F5}"/>
+              </a:ext>
+            </a:extLst>
+          </p:cNvPr>
+          <p:cNvPicPr>
+            <a:picLocks noChangeAspect="1"/>
+          </p:cNvPicPr>
+          <p:nvPr/>
+        </p:nvPicPr>
+        <p:blipFill>
+          <a:blip r:embed="rId2"/>
+          <a:stretch>
+            <a:fillRect/>
+          </a:stretch>
+        </p:blipFill>
+        <p:spPr>
+          <a:xfrm>
+            <a:off x="6672091" y="650494"/>
+            <a:ext cx="4259312" cy="5324142"/>
+          </a:xfrm>
+          <a:prstGeom prst="rect">
+            <a:avLst/>
+          </a:prstGeom>
+        </p:spPr>
+      </p:pic>
     </p:spTree>
     <p:extLst>
       <p:ext uri="{BB962C8B-B14F-4D97-AF65-F5344CB8AC3E}">
@@ -6422,17 +6055,9 @@
 </p:sld>
 </file>
 
-<file path=ppt/slides/slide7.xml><?xml version="1.0" encoding="utf-8"?>
+<file path=ppt/slides/slide6.xml><?xml version="1.0" encoding="utf-8"?>
 <p:sld xmlns:a="http://schemas.openxmlformats.org/drawingml/2006/main" xmlns:r="http://schemas.openxmlformats.org/officeDocument/2006/relationships" xmlns:p="http://schemas.openxmlformats.org/presentationml/2006/main">
   <p:cSld>
-    <p:bg>
-      <p:bgPr>
-        <a:solidFill>
-          <a:schemeClr val="bg1"/>
-        </a:solidFill>
-        <a:effectLst/>
-      </p:bgPr>
-    </p:bg>
     <p:spTree>
       <p:nvGrpSpPr>
         <p:cNvPr id="1" name=""/>
@@ -6452,7 +6077,7 @@
           <p:cNvPr id="2" name="Title 1">
             <a:extLst>
               <a:ext uri="{FF2B5EF4-FFF2-40B4-BE49-F238E27FC236}">
-                <a16:creationId xmlns:a16="http://schemas.microsoft.com/office/drawing/2014/main" id="{0F62CE63-DEC4-40D2-B99D-318F10ABA7C6}"/>
+                <a16:creationId xmlns:a16="http://schemas.microsoft.com/office/drawing/2014/main" id="{20CC1B31-CE78-140A-9BBD-AA0C569653F1}"/>
               </a:ext>
             </a:extLst>
           </p:cNvPr>
@@ -6465,19 +6090,17 @@
         </p:nvSpPr>
         <p:spPr>
           <a:xfrm>
-            <a:off x="648928" y="338328"/>
-            <a:ext cx="3685032" cy="1608328"/>
+            <a:off x="838200" y="365125"/>
+            <a:ext cx="5139588" cy="1325563"/>
           </a:xfrm>
         </p:spPr>
         <p:txBody>
-          <a:bodyPr>
-            <a:normAutofit/>
-          </a:bodyPr>
-          <a:lstStyle/>
-          <a:p>
-            <a:r>
-              <a:rPr lang="en-US" sz="3600" dirty="0"/>
-              <a:t>Project folder</a:t>
+          <a:bodyPr/>
+          <a:lstStyle/>
+          <a:p>
+            <a:r>
+              <a:rPr lang="en-US" dirty="0"/>
+              <a:t>Anatomy of a Working Directory</a:t>
             </a:r>
           </a:p>
         </p:txBody>
@@ -6487,7 +6110,7 @@
           <p:cNvPr id="3" name="Content Placeholder 2">
             <a:extLst>
               <a:ext uri="{FF2B5EF4-FFF2-40B4-BE49-F238E27FC236}">
-                <a16:creationId xmlns:a16="http://schemas.microsoft.com/office/drawing/2014/main" id="{468136B0-1E08-45E6-A7AF-D1685FDFDABC}"/>
+                <a16:creationId xmlns:a16="http://schemas.microsoft.com/office/drawing/2014/main" id="{210C7477-7FB1-1A14-8619-2747EA37BB8D}"/>
               </a:ext>
             </a:extLst>
           </p:cNvPr>
@@ -6500,1364 +6123,104 @@
         </p:nvSpPr>
         <p:spPr>
           <a:xfrm>
-            <a:off x="4864100" y="338328"/>
-            <a:ext cx="6675627" cy="1605083"/>
+            <a:off x="838200" y="1825625"/>
+            <a:ext cx="4999182" cy="4351338"/>
           </a:xfrm>
         </p:spPr>
         <p:txBody>
-          <a:bodyPr anchor="ctr">
-            <a:normAutofit/>
-          </a:bodyPr>
-          <a:lstStyle/>
-          <a:p>
-            <a:r>
-              <a:rPr lang="en-US" sz="2000" dirty="0">
+          <a:bodyPr/>
+          <a:lstStyle/>
+          <a:p>
+            <a:r>
+              <a:rPr lang="en-US" sz="3200" dirty="0">
+                <a:solidFill>
+                  <a:srgbClr val="414141"/>
+                </a:solidFill>
                 <a:latin typeface="+mj-lt"/>
               </a:rPr>
-              <a:t>AnimalsSampled_Export_May16_0438.csv</a:t>
-            </a:r>
-            <a:br>
-              <a:rPr lang="en-US" sz="2000" dirty="0">
+              <a:t>Every R project should start with an .</a:t>
+            </a:r>
+            <a:r>
+              <a:rPr lang="en-US" sz="3200" dirty="0" err="1">
+                <a:solidFill>
+                  <a:srgbClr val="414141"/>
+                </a:solidFill>
                 <a:latin typeface="+mj-lt"/>
               </a:rPr>
-            </a:br>
-            <a:r>
-              <a:rPr lang="en-US" sz="2000" dirty="0">
+              <a:t>Rproj</a:t>
+            </a:r>
+            <a:r>
+              <a:rPr lang="en-US" sz="3200" dirty="0">
+                <a:solidFill>
+                  <a:srgbClr val="414141"/>
+                </a:solidFill>
                 <a:latin typeface="+mj-lt"/>
               </a:rPr>
-              <a:t>Site_Exoort_May18_2353.csv</a:t>
-            </a:r>
-          </a:p>
-        </p:txBody>
-      </p:sp>
-      <p:sp>
-        <p:nvSpPr>
-          <p:cNvPr id="17" name="Rectangle 16">
-            <a:extLst>
-              <a:ext uri="{FF2B5EF4-FFF2-40B4-BE49-F238E27FC236}">
-                <a16:creationId xmlns:a16="http://schemas.microsoft.com/office/drawing/2014/main" id="{5AAE9118-0436-4488-AC4A-C14DF6A7B6B1}"/>
-              </a:ext>
-              <a:ext uri="{C183D7F6-B498-43B3-948B-1728B52AA6E4}">
-                <adec:decorative xmlns:adec="http://schemas.microsoft.com/office/drawing/2017/decorative" val="1"/>
-              </a:ext>
-            </a:extLst>
-          </p:cNvPr>
-          <p:cNvSpPr>
-            <a:spLocks noGrp="1" noRot="1" noChangeAspect="1" noMove="1" noResize="1" noEditPoints="1" noAdjustHandles="1" noChangeArrowheads="1" noChangeShapeType="1" noTextEdit="1"/>
-          </p:cNvSpPr>
-          <p:nvPr>
-            <p:extLst>
-              <p:ext uri="{386F3935-93C4-4BCD-93E2-E3B085C9AB24}">
-                <p16:designElem xmlns:p16="http://schemas.microsoft.com/office/powerpoint/2015/main" val="1"/>
-              </p:ext>
-            </p:extLst>
-          </p:nvPr>
-        </p:nvSpPr>
-        <p:spPr>
-          <a:xfrm>
-            <a:off x="-2" y="2211010"/>
-            <a:ext cx="12192002" cy="4646990"/>
-          </a:xfrm>
-          <a:prstGeom prst="rect">
-            <a:avLst/>
-          </a:prstGeom>
-          <a:solidFill>
-            <a:srgbClr val="C8CACA"/>
-          </a:solidFill>
-          <a:ln>
-            <a:noFill/>
-          </a:ln>
-        </p:spPr>
-        <p:style>
-          <a:lnRef idx="2">
-            <a:schemeClr val="accent1">
-              <a:shade val="50000"/>
-            </a:schemeClr>
-          </a:lnRef>
-          <a:fillRef idx="1">
-            <a:schemeClr val="accent1"/>
-          </a:fillRef>
-          <a:effectRef idx="0">
-            <a:schemeClr val="accent1"/>
-          </a:effectRef>
-          <a:fontRef idx="minor">
-            <a:schemeClr val="lt1"/>
-          </a:fontRef>
-        </p:style>
-        <p:txBody>
-          <a:bodyPr rtlCol="0" anchor="ctr"/>
-          <a:lstStyle/>
-          <a:p>
-            <a:pPr marL="0" marR="0" lvl="0" indent="0" algn="ctr" defTabSz="914400" rtl="0" eaLnBrk="1" fontAlgn="auto" latinLnBrk="0" hangingPunct="1">
-              <a:lnSpc>
-                <a:spcPct val="100000"/>
-              </a:lnSpc>
-              <a:spcBef>
-                <a:spcPts val="0"/>
-              </a:spcBef>
-              <a:spcAft>
-                <a:spcPts val="0"/>
-              </a:spcAft>
-              <a:buClrTx/>
-              <a:buSzTx/>
-              <a:buFontTx/>
-              <a:buNone/>
-              <a:tabLst/>
-              <a:defRPr/>
-            </a:pPr>
-            <a:endParaRPr kumimoji="0" lang="en-US" sz="1800" b="0" i="0" u="none" strike="noStrike" kern="1200" cap="none" spc="0" normalizeH="0" baseline="0" noProof="0">
-              <a:ln>
-                <a:noFill/>
-              </a:ln>
-              <a:solidFill>
-                <a:prstClr val="white"/>
-              </a:solidFill>
-              <a:effectLst/>
-              <a:uLnTx/>
-              <a:uFillTx/>
-              <a:latin typeface="Calibri" panose="020F0502020204030204"/>
-              <a:ea typeface="+mn-ea"/>
-              <a:cs typeface="+mn-cs"/>
-            </a:endParaRPr>
-          </a:p>
-        </p:txBody>
-      </p:sp>
-      <p:sp>
-        <p:nvSpPr>
-          <p:cNvPr id="19" name="Rounded Rectangle 26">
-            <a:extLst>
-              <a:ext uri="{FF2B5EF4-FFF2-40B4-BE49-F238E27FC236}">
-                <a16:creationId xmlns:a16="http://schemas.microsoft.com/office/drawing/2014/main" id="{1B10F861-B8F1-49C7-BD58-EAB20CEE7F93}"/>
-              </a:ext>
-              <a:ext uri="{C183D7F6-B498-43B3-948B-1728B52AA6E4}">
-                <adec:decorative xmlns:adec="http://schemas.microsoft.com/office/drawing/2017/decorative" val="1"/>
-              </a:ext>
-            </a:extLst>
-          </p:cNvPr>
-          <p:cNvSpPr>
-            <a:spLocks noGrp="1" noRot="1" noChangeAspect="1" noMove="1" noResize="1" noEditPoints="1" noAdjustHandles="1" noChangeArrowheads="1" noChangeShapeType="1" noTextEdit="1"/>
-          </p:cNvSpPr>
-          <p:nvPr>
-            <p:extLst>
-              <p:ext uri="{386F3935-93C4-4BCD-93E2-E3B085C9AB24}">
-                <p16:designElem xmlns:p16="http://schemas.microsoft.com/office/powerpoint/2015/main" val="1"/>
-              </p:ext>
-            </p:extLst>
-          </p:nvPr>
-        </p:nvSpPr>
-        <p:spPr>
-          <a:xfrm>
-            <a:off x="321564" y="2423160"/>
-            <a:ext cx="5613569" cy="3930315"/>
-          </a:xfrm>
-          <a:prstGeom prst="roundRect">
-            <a:avLst>
-              <a:gd name="adj" fmla="val 0"/>
-            </a:avLst>
-          </a:prstGeom>
-          <a:solidFill>
-            <a:srgbClr val="FFFFFF"/>
-          </a:solidFill>
-          <a:ln w="9525">
-            <a:solidFill>
-              <a:srgbClr val="C8CACA"/>
-            </a:solidFill>
-          </a:ln>
-          <a:effectLst>
-            <a:outerShdw blurRad="57150" dist="19050" dir="5400000" algn="t" rotWithShape="0">
-              <a:prstClr val="black">
-                <a:alpha val="63000"/>
-              </a:prstClr>
-            </a:outerShdw>
-          </a:effectLst>
-        </p:spPr>
-        <p:style>
-          <a:lnRef idx="2">
-            <a:schemeClr val="accent1">
-              <a:shade val="50000"/>
-            </a:schemeClr>
-          </a:lnRef>
-          <a:fillRef idx="1">
-            <a:schemeClr val="accent1"/>
-          </a:fillRef>
-          <a:effectRef idx="0">
-            <a:schemeClr val="accent1"/>
-          </a:effectRef>
-          <a:fontRef idx="minor">
-            <a:schemeClr val="lt1"/>
-          </a:fontRef>
-        </p:style>
-        <p:txBody>
-          <a:bodyPr rtlCol="0" anchor="ctr"/>
-          <a:lstStyle/>
-          <a:p>
-            <a:pPr algn="ctr"/>
-            <a:endParaRPr lang="en-US"/>
+              <a:t> file (</a:t>
+            </a:r>
+            <a:r>
+              <a:rPr lang="en-US" sz="3200" dirty="0" err="1">
+                <a:solidFill>
+                  <a:srgbClr val="414141"/>
+                </a:solidFill>
+                <a:latin typeface="+mj-lt"/>
+              </a:rPr>
+              <a:t>rstudio</a:t>
+            </a:r>
+            <a:r>
+              <a:rPr lang="en-US" sz="3200" dirty="0">
+                <a:solidFill>
+                  <a:srgbClr val="414141"/>
+                </a:solidFill>
+                <a:latin typeface="+mj-lt"/>
+              </a:rPr>
+              <a:t>). </a:t>
+            </a:r>
+          </a:p>
+          <a:p>
+            <a:r>
+              <a:rPr lang="en-US" sz="3200" dirty="0">
+                <a:solidFill>
+                  <a:srgbClr val="414141"/>
+                </a:solidFill>
+                <a:latin typeface="+mj-lt"/>
+              </a:rPr>
+              <a:t>Keep raw data immutable — never overwrite it.</a:t>
+            </a:r>
+          </a:p>
+          <a:p>
+            <a:r>
+              <a:rPr lang="en-US" sz="3200" dirty="0">
+                <a:solidFill>
+                  <a:srgbClr val="414141"/>
+                </a:solidFill>
+                <a:latin typeface="+mj-lt"/>
+              </a:rPr>
+              <a:t>Modularize code by task.</a:t>
+            </a:r>
+          </a:p>
+          <a:p>
+            <a:r>
+              <a:rPr lang="en-US" sz="3200" dirty="0">
+                <a:solidFill>
+                  <a:srgbClr val="414141"/>
+                </a:solidFill>
+                <a:latin typeface="+mj-lt"/>
+              </a:rPr>
+              <a:t>Store outputs (plots, summaries) separately.</a:t>
+            </a:r>
+          </a:p>
+          <a:p>
+            <a:endParaRPr lang="en-US" dirty="0"/>
           </a:p>
         </p:txBody>
       </p:sp>
       <p:pic>
         <p:nvPicPr>
-          <p:cNvPr id="5" name="Picture 4">
-            <a:extLst>
-              <a:ext uri="{FF2B5EF4-FFF2-40B4-BE49-F238E27FC236}">
-                <a16:creationId xmlns:a16="http://schemas.microsoft.com/office/drawing/2014/main" id="{CFF22101-0D5D-4A23-B5C3-95E1B4640F1D}"/>
-              </a:ext>
-            </a:extLst>
-          </p:cNvPr>
-          <p:cNvPicPr>
-            <a:picLocks noChangeAspect="1"/>
-          </p:cNvPicPr>
-          <p:nvPr/>
-        </p:nvPicPr>
-        <p:blipFill>
-          <a:blip r:embed="rId2"/>
-          <a:stretch>
-            <a:fillRect/>
-          </a:stretch>
-        </p:blipFill>
-        <p:spPr>
-          <a:xfrm>
-            <a:off x="1030894" y="2742397"/>
-            <a:ext cx="4194908" cy="3291840"/>
-          </a:xfrm>
-          <a:prstGeom prst="rect">
-            <a:avLst/>
-          </a:prstGeom>
-        </p:spPr>
-      </p:pic>
-      <p:sp>
-        <p:nvSpPr>
-          <p:cNvPr id="21" name="Rounded Rectangle 16">
-            <a:extLst>
-              <a:ext uri="{FF2B5EF4-FFF2-40B4-BE49-F238E27FC236}">
-                <a16:creationId xmlns:a16="http://schemas.microsoft.com/office/drawing/2014/main" id="{61F6E425-22AB-4DA2-8FAC-58ADB58EF6C3}"/>
-              </a:ext>
-              <a:ext uri="{C183D7F6-B498-43B3-948B-1728B52AA6E4}">
-                <adec:decorative xmlns:adec="http://schemas.microsoft.com/office/drawing/2017/decorative" val="1"/>
-              </a:ext>
-            </a:extLst>
-          </p:cNvPr>
-          <p:cNvSpPr>
-            <a:spLocks noGrp="1" noRot="1" noChangeAspect="1" noMove="1" noResize="1" noEditPoints="1" noAdjustHandles="1" noChangeArrowheads="1" noChangeShapeType="1" noTextEdit="1"/>
-          </p:cNvSpPr>
-          <p:nvPr>
-            <p:extLst>
-              <p:ext uri="{386F3935-93C4-4BCD-93E2-E3B085C9AB24}">
-                <p16:designElem xmlns:p16="http://schemas.microsoft.com/office/powerpoint/2015/main" val="1"/>
-              </p:ext>
-            </p:extLst>
-          </p:nvPr>
-        </p:nvSpPr>
-        <p:spPr>
-          <a:xfrm>
-            <a:off x="6254749" y="2423160"/>
-            <a:ext cx="5613569" cy="3930315"/>
-          </a:xfrm>
-          <a:prstGeom prst="roundRect">
-            <a:avLst>
-              <a:gd name="adj" fmla="val 0"/>
-            </a:avLst>
-          </a:prstGeom>
-          <a:solidFill>
-            <a:srgbClr val="FFFFFF"/>
-          </a:solidFill>
-          <a:ln w="9525">
-            <a:solidFill>
-              <a:srgbClr val="C8CACA"/>
-            </a:solidFill>
-          </a:ln>
-          <a:effectLst>
-            <a:outerShdw blurRad="57150" dist="19050" dir="5400000" algn="t" rotWithShape="0">
-              <a:prstClr val="black">
-                <a:alpha val="63000"/>
-              </a:prstClr>
-            </a:outerShdw>
-          </a:effectLst>
-        </p:spPr>
-        <p:style>
-          <a:lnRef idx="2">
-            <a:schemeClr val="accent1">
-              <a:shade val="50000"/>
-            </a:schemeClr>
-          </a:lnRef>
-          <a:fillRef idx="1">
-            <a:schemeClr val="accent1"/>
-          </a:fillRef>
-          <a:effectRef idx="0">
-            <a:schemeClr val="accent1"/>
-          </a:effectRef>
-          <a:fontRef idx="minor">
-            <a:schemeClr val="lt1"/>
-          </a:fontRef>
-        </p:style>
-        <p:txBody>
-          <a:bodyPr rtlCol="0" anchor="ctr"/>
-          <a:lstStyle/>
-          <a:p>
-            <a:pPr algn="ctr"/>
-            <a:endParaRPr lang="en-US"/>
-          </a:p>
-        </p:txBody>
-      </p:sp>
-      <p:pic>
-        <p:nvPicPr>
-          <p:cNvPr id="13" name="Picture 12">
-            <a:extLst>
-              <a:ext uri="{FF2B5EF4-FFF2-40B4-BE49-F238E27FC236}">
-                <a16:creationId xmlns:a16="http://schemas.microsoft.com/office/drawing/2014/main" id="{C9041786-3BE5-4D4A-A166-43FA0DC7E4BE}"/>
-              </a:ext>
-            </a:extLst>
-          </p:cNvPr>
-          <p:cNvPicPr>
-            <a:picLocks noChangeAspect="1"/>
-          </p:cNvPicPr>
-          <p:nvPr/>
-        </p:nvPicPr>
-        <p:blipFill>
-          <a:blip r:embed="rId3"/>
-          <a:stretch>
-            <a:fillRect/>
-          </a:stretch>
-        </p:blipFill>
-        <p:spPr>
-          <a:xfrm>
-            <a:off x="6519985" y="2742397"/>
-            <a:ext cx="4004946" cy="3435135"/>
-          </a:xfrm>
-          <a:prstGeom prst="rect">
-            <a:avLst/>
-          </a:prstGeom>
-        </p:spPr>
-      </p:pic>
-    </p:spTree>
-    <p:extLst>
-      <p:ext uri="{BB962C8B-B14F-4D97-AF65-F5344CB8AC3E}">
-        <p14:creationId xmlns:p14="http://schemas.microsoft.com/office/powerpoint/2010/main" val="2611913269"/>
-      </p:ext>
-    </p:extLst>
-  </p:cSld>
-  <p:clrMapOvr>
-    <a:masterClrMapping/>
-  </p:clrMapOvr>
-</p:sld>
-</file>
-
-<file path=ppt/slides/slide8.xml><?xml version="1.0" encoding="utf-8"?>
-<p:sld xmlns:a="http://schemas.openxmlformats.org/drawingml/2006/main" xmlns:r="http://schemas.openxmlformats.org/officeDocument/2006/relationships" xmlns:p="http://schemas.openxmlformats.org/presentationml/2006/main">
-  <p:cSld>
-    <p:bg>
-      <p:bgPr>
-        <a:solidFill>
-          <a:schemeClr val="bg1"/>
-        </a:solidFill>
-        <a:effectLst/>
-      </p:bgPr>
-    </p:bg>
-    <p:spTree>
-      <p:nvGrpSpPr>
-        <p:cNvPr id="1" name=""/>
-        <p:cNvGrpSpPr/>
-        <p:nvPr/>
-      </p:nvGrpSpPr>
-      <p:grpSpPr>
-        <a:xfrm>
-          <a:off x="0" y="0"/>
-          <a:ext cx="0" cy="0"/>
-          <a:chOff x="0" y="0"/>
-          <a:chExt cx="0" cy="0"/>
-        </a:xfrm>
-      </p:grpSpPr>
-      <p:sp useBgFill="1">
-        <p:nvSpPr>
-          <p:cNvPr id="11" name="Rectangle 10">
-            <a:extLst>
-              <a:ext uri="{FF2B5EF4-FFF2-40B4-BE49-F238E27FC236}">
-                <a16:creationId xmlns:a16="http://schemas.microsoft.com/office/drawing/2014/main" id="{DBC6133C-0615-4CE4-9132-37E609A9BDFA}"/>
-              </a:ext>
-              <a:ext uri="{C183D7F6-B498-43B3-948B-1728B52AA6E4}">
-                <adec:decorative xmlns:adec="http://schemas.microsoft.com/office/drawing/2017/decorative" val="1"/>
-              </a:ext>
-            </a:extLst>
-          </p:cNvPr>
-          <p:cNvSpPr>
-            <a:spLocks noGrp="1" noRot="1" noChangeAspect="1" noMove="1" noResize="1" noEditPoints="1" noAdjustHandles="1" noChangeArrowheads="1" noChangeShapeType="1" noTextEdit="1"/>
-          </p:cNvSpPr>
-          <p:nvPr>
-            <p:extLst>
-              <p:ext uri="{386F3935-93C4-4BCD-93E2-E3B085C9AB24}">
-                <p16:designElem xmlns:p16="http://schemas.microsoft.com/office/powerpoint/2015/main" val="1"/>
-              </p:ext>
-            </p:extLst>
-          </p:nvPr>
-        </p:nvSpPr>
-        <p:spPr>
-          <a:xfrm>
-            <a:off x="0" y="0"/>
-            <a:ext cx="12191999" cy="6857365"/>
-          </a:xfrm>
-          <a:prstGeom prst="rect">
-            <a:avLst/>
-          </a:prstGeom>
-          <a:ln>
-            <a:noFill/>
-          </a:ln>
-        </p:spPr>
-        <p:style>
-          <a:lnRef idx="2">
-            <a:schemeClr val="accent1">
-              <a:shade val="50000"/>
-            </a:schemeClr>
-          </a:lnRef>
-          <a:fillRef idx="1">
-            <a:schemeClr val="accent1"/>
-          </a:fillRef>
-          <a:effectRef idx="0">
-            <a:schemeClr val="accent1"/>
-          </a:effectRef>
-          <a:fontRef idx="minor">
-            <a:schemeClr val="lt1"/>
-          </a:fontRef>
-        </p:style>
-        <p:txBody>
-          <a:bodyPr rtlCol="0" anchor="ctr"/>
-          <a:lstStyle/>
-          <a:p>
-            <a:pPr algn="ctr"/>
-            <a:endParaRPr lang="en-US"/>
-          </a:p>
-        </p:txBody>
-      </p:sp>
-      <p:sp>
-        <p:nvSpPr>
-          <p:cNvPr id="2" name="Title 1">
-            <a:extLst>
-              <a:ext uri="{FF2B5EF4-FFF2-40B4-BE49-F238E27FC236}">
-                <a16:creationId xmlns:a16="http://schemas.microsoft.com/office/drawing/2014/main" id="{2EE16251-DCCC-4FF5-92D2-C3A619F308C2}"/>
-              </a:ext>
-            </a:extLst>
-          </p:cNvPr>
-          <p:cNvSpPr>
-            <a:spLocks noGrp="1"/>
-          </p:cNvSpPr>
-          <p:nvPr>
-            <p:ph type="title"/>
-          </p:nvPr>
-        </p:nvSpPr>
-        <p:spPr>
-          <a:xfrm>
-            <a:off x="645064" y="525982"/>
-            <a:ext cx="4282983" cy="1200361"/>
-          </a:xfrm>
-        </p:spPr>
-        <p:txBody>
-          <a:bodyPr anchor="b">
-            <a:normAutofit/>
-          </a:bodyPr>
-          <a:lstStyle/>
-          <a:p>
-            <a:r>
-              <a:rPr lang="en-US" sz="3600" dirty="0"/>
-              <a:t>Protect your raw data</a:t>
-            </a:r>
-          </a:p>
-        </p:txBody>
-      </p:sp>
-      <p:sp>
-        <p:nvSpPr>
-          <p:cNvPr id="13" name="Rectangle 12">
-            <a:extLst>
-              <a:ext uri="{FF2B5EF4-FFF2-40B4-BE49-F238E27FC236}">
-                <a16:creationId xmlns:a16="http://schemas.microsoft.com/office/drawing/2014/main" id="{169CC832-2974-4E8D-90ED-3E2941BA7336}"/>
-              </a:ext>
-              <a:ext uri="{C183D7F6-B498-43B3-948B-1728B52AA6E4}">
-                <adec:decorative xmlns:adec="http://schemas.microsoft.com/office/drawing/2017/decorative" val="1"/>
-              </a:ext>
-            </a:extLst>
-          </p:cNvPr>
-          <p:cNvSpPr>
-            <a:spLocks noGrp="1" noRot="1" noChangeAspect="1" noMove="1" noResize="1" noEditPoints="1" noAdjustHandles="1" noChangeArrowheads="1" noChangeShapeType="1" noTextEdit="1"/>
-          </p:cNvSpPr>
-          <p:nvPr>
-            <p:extLst>
-              <p:ext uri="{386F3935-93C4-4BCD-93E2-E3B085C9AB24}">
-                <p16:designElem xmlns:p16="http://schemas.microsoft.com/office/powerpoint/2015/main" val="1"/>
-              </p:ext>
-            </p:extLst>
-          </p:nvPr>
-        </p:nvSpPr>
-        <p:spPr>
-          <a:xfrm flipH="1">
-            <a:off x="616533" y="1944913"/>
-            <a:ext cx="4023360" cy="27432"/>
-          </a:xfrm>
-          <a:prstGeom prst="rect">
-            <a:avLst/>
-          </a:prstGeom>
-          <a:solidFill>
-            <a:schemeClr val="accent4"/>
-          </a:solidFill>
-          <a:ln>
-            <a:noFill/>
-          </a:ln>
-        </p:spPr>
-        <p:style>
-          <a:lnRef idx="2">
-            <a:schemeClr val="accent1">
-              <a:shade val="50000"/>
-            </a:schemeClr>
-          </a:lnRef>
-          <a:fillRef idx="1">
-            <a:schemeClr val="accent1"/>
-          </a:fillRef>
-          <a:effectRef idx="0">
-            <a:schemeClr val="accent1"/>
-          </a:effectRef>
-          <a:fontRef idx="minor">
-            <a:schemeClr val="lt1"/>
-          </a:fontRef>
-        </p:style>
-        <p:txBody>
-          <a:bodyPr rtlCol="0" anchor="ctr"/>
-          <a:lstStyle/>
-          <a:p>
-            <a:pPr algn="ctr"/>
-            <a:endParaRPr lang="en-US"/>
-          </a:p>
-        </p:txBody>
-      </p:sp>
-      <p:sp>
-        <p:nvSpPr>
-          <p:cNvPr id="3" name="Content Placeholder 2">
-            <a:extLst>
-              <a:ext uri="{FF2B5EF4-FFF2-40B4-BE49-F238E27FC236}">
-                <a16:creationId xmlns:a16="http://schemas.microsoft.com/office/drawing/2014/main" id="{C9583D61-7021-4D27-BE84-06A36EA86670}"/>
-              </a:ext>
-            </a:extLst>
-          </p:cNvPr>
-          <p:cNvSpPr>
-            <a:spLocks noGrp="1"/>
-          </p:cNvSpPr>
-          <p:nvPr>
-            <p:ph idx="1"/>
-          </p:nvPr>
-        </p:nvSpPr>
-        <p:spPr>
-          <a:xfrm>
-            <a:off x="645066" y="2031101"/>
-            <a:ext cx="4282984" cy="3511943"/>
-          </a:xfrm>
-        </p:spPr>
-        <p:txBody>
-          <a:bodyPr anchor="ctr">
-            <a:normAutofit/>
-          </a:bodyPr>
-          <a:lstStyle/>
-          <a:p>
-            <a:r>
-              <a:rPr lang="en-US" sz="1800" dirty="0">
-                <a:latin typeface="+mj-lt"/>
-              </a:rPr>
-              <a:t>Do not edit raw data directly</a:t>
-            </a:r>
-          </a:p>
-          <a:p>
-            <a:r>
-              <a:rPr lang="en-US" sz="1800" dirty="0">
-                <a:latin typeface="+mj-lt"/>
-              </a:rPr>
-              <a:t>Copy and worn with it so the original data is not modified </a:t>
-            </a:r>
-          </a:p>
-          <a:p>
-            <a:endParaRPr lang="en-US" sz="1800" dirty="0"/>
-          </a:p>
-        </p:txBody>
-      </p:sp>
-      <p:sp>
-        <p:nvSpPr>
-          <p:cNvPr id="15" name="Rectangle 14">
-            <a:extLst>
-              <a:ext uri="{FF2B5EF4-FFF2-40B4-BE49-F238E27FC236}">
-                <a16:creationId xmlns:a16="http://schemas.microsoft.com/office/drawing/2014/main" id="{55222F96-971A-4F90-B841-6BAB416C7AC1}"/>
-              </a:ext>
-              <a:ext uri="{C183D7F6-B498-43B3-948B-1728B52AA6E4}">
-                <adec:decorative xmlns:adec="http://schemas.microsoft.com/office/drawing/2017/decorative" val="1"/>
-              </a:ext>
-            </a:extLst>
-          </p:cNvPr>
-          <p:cNvSpPr>
-            <a:spLocks noGrp="1" noRot="1" noChangeAspect="1" noMove="1" noResize="1" noEditPoints="1" noAdjustHandles="1" noChangeArrowheads="1" noChangeShapeType="1" noTextEdit="1"/>
-          </p:cNvSpPr>
-          <p:nvPr>
-            <p:extLst>
-              <p:ext uri="{386F3935-93C4-4BCD-93E2-E3B085C9AB24}">
-                <p16:designElem xmlns:p16="http://schemas.microsoft.com/office/powerpoint/2015/main" val="1"/>
-              </p:ext>
-            </p:extLst>
-          </p:nvPr>
-        </p:nvSpPr>
-        <p:spPr>
-          <a:xfrm rot="5400000">
-            <a:off x="-225843" y="6053360"/>
-            <a:ext cx="740664" cy="154124"/>
-          </a:xfrm>
-          <a:prstGeom prst="rect">
-            <a:avLst/>
-          </a:prstGeom>
-          <a:solidFill>
-            <a:schemeClr val="accent4"/>
-          </a:solidFill>
-          <a:ln>
-            <a:noFill/>
-          </a:ln>
-        </p:spPr>
-        <p:style>
-          <a:lnRef idx="2">
-            <a:schemeClr val="accent1">
-              <a:shade val="50000"/>
-            </a:schemeClr>
-          </a:lnRef>
-          <a:fillRef idx="1">
-            <a:schemeClr val="accent1"/>
-          </a:fillRef>
-          <a:effectRef idx="0">
-            <a:schemeClr val="accent1"/>
-          </a:effectRef>
-          <a:fontRef idx="minor">
-            <a:schemeClr val="lt1"/>
-          </a:fontRef>
-        </p:style>
-        <p:txBody>
-          <a:bodyPr rtlCol="0" anchor="ctr"/>
-          <a:lstStyle/>
-          <a:p>
-            <a:pPr algn="ctr"/>
-            <a:endParaRPr lang="en-US"/>
-          </a:p>
-        </p:txBody>
-      </p:sp>
-      <p:sp>
-        <p:nvSpPr>
-          <p:cNvPr id="17" name="Rectangle 16">
-            <a:extLst>
-              <a:ext uri="{FF2B5EF4-FFF2-40B4-BE49-F238E27FC236}">
-                <a16:creationId xmlns:a16="http://schemas.microsoft.com/office/drawing/2014/main" id="{08980754-6F4B-43C9-B9BE-127B6BED6586}"/>
-              </a:ext>
-              <a:ext uri="{C183D7F6-B498-43B3-948B-1728B52AA6E4}">
-                <adec:decorative xmlns:adec="http://schemas.microsoft.com/office/drawing/2017/decorative" val="1"/>
-              </a:ext>
-            </a:extLst>
-          </p:cNvPr>
-          <p:cNvSpPr>
-            <a:spLocks noGrp="1" noRot="1" noChangeAspect="1" noMove="1" noResize="1" noEditPoints="1" noAdjustHandles="1" noChangeArrowheads="1" noChangeShapeType="1" noTextEdit="1"/>
-          </p:cNvSpPr>
-          <p:nvPr>
-            <p:extLst>
-              <p:ext uri="{386F3935-93C4-4BCD-93E2-E3B085C9AB24}">
-                <p16:designElem xmlns:p16="http://schemas.microsoft.com/office/powerpoint/2015/main" val="1"/>
-              </p:ext>
-            </p:extLst>
-          </p:nvPr>
-        </p:nvSpPr>
-        <p:spPr>
-          <a:xfrm rot="5400000">
-            <a:off x="5904923" y="215201"/>
-            <a:ext cx="740664" cy="11833491"/>
-          </a:xfrm>
-          <a:prstGeom prst="rect">
-            <a:avLst/>
-          </a:prstGeom>
-          <a:solidFill>
-            <a:schemeClr val="accent4"/>
-          </a:solidFill>
-          <a:ln>
-            <a:noFill/>
-          </a:ln>
-        </p:spPr>
-        <p:style>
-          <a:lnRef idx="2">
-            <a:schemeClr val="accent1">
-              <a:shade val="50000"/>
-            </a:schemeClr>
-          </a:lnRef>
-          <a:fillRef idx="1">
-            <a:schemeClr val="accent1"/>
-          </a:fillRef>
-          <a:effectRef idx="0">
-            <a:schemeClr val="accent1"/>
-          </a:effectRef>
-          <a:fontRef idx="minor">
-            <a:schemeClr val="lt1"/>
-          </a:fontRef>
-        </p:style>
-        <p:txBody>
-          <a:bodyPr rtlCol="0" anchor="ctr"/>
-          <a:lstStyle/>
-          <a:p>
-            <a:pPr algn="ctr"/>
-            <a:endParaRPr lang="en-US"/>
-          </a:p>
-        </p:txBody>
-      </p:sp>
-      <p:sp>
-        <p:nvSpPr>
-          <p:cNvPr id="19" name="Rectangle 18">
-            <a:extLst>
-              <a:ext uri="{FF2B5EF4-FFF2-40B4-BE49-F238E27FC236}">
-                <a16:creationId xmlns:a16="http://schemas.microsoft.com/office/drawing/2014/main" id="{2C1BBA94-3F40-40AA-8BB9-E69E25E537C1}"/>
-              </a:ext>
-              <a:ext uri="{C183D7F6-B498-43B3-948B-1728B52AA6E4}">
-                <adec:decorative xmlns:adec="http://schemas.microsoft.com/office/drawing/2017/decorative" val="1"/>
-              </a:ext>
-            </a:extLst>
-          </p:cNvPr>
-          <p:cNvSpPr>
-            <a:spLocks noGrp="1" noRot="1" noChangeAspect="1" noMove="1" noResize="1" noEditPoints="1" noAdjustHandles="1" noChangeArrowheads="1" noChangeShapeType="1" noTextEdit="1"/>
-          </p:cNvSpPr>
-          <p:nvPr>
-            <p:extLst>
-              <p:ext uri="{386F3935-93C4-4BCD-93E2-E3B085C9AB24}">
-                <p16:designElem xmlns:p16="http://schemas.microsoft.com/office/powerpoint/2015/main" val="1"/>
-              </p:ext>
-            </p:extLst>
-          </p:nvPr>
-        </p:nvSpPr>
-        <p:spPr>
-          <a:xfrm>
-            <a:off x="5696793" y="354959"/>
-            <a:ext cx="6184973" cy="5915212"/>
-          </a:xfrm>
-          <a:prstGeom prst="rect">
-            <a:avLst/>
-          </a:prstGeom>
-          <a:solidFill>
-            <a:schemeClr val="bg1"/>
-          </a:solidFill>
-          <a:ln>
-            <a:noFill/>
-          </a:ln>
-          <a:effectLst>
-            <a:outerShdw blurRad="139700" dist="127000" dir="5400000" algn="t" rotWithShape="0">
-              <a:prstClr val="black">
-                <a:alpha val="15000"/>
-              </a:prstClr>
-            </a:outerShdw>
-          </a:effectLst>
-        </p:spPr>
-        <p:style>
-          <a:lnRef idx="2">
-            <a:schemeClr val="accent1">
-              <a:shade val="50000"/>
-            </a:schemeClr>
-          </a:lnRef>
-          <a:fillRef idx="1">
-            <a:schemeClr val="accent1"/>
-          </a:fillRef>
-          <a:effectRef idx="0">
-            <a:schemeClr val="accent1"/>
-          </a:effectRef>
-          <a:fontRef idx="minor">
-            <a:schemeClr val="lt1"/>
-          </a:fontRef>
-        </p:style>
-        <p:txBody>
-          <a:bodyPr rtlCol="0" anchor="ctr"/>
-          <a:lstStyle/>
-          <a:p>
-            <a:pPr algn="ctr"/>
-            <a:endParaRPr lang="en-US"/>
-          </a:p>
-        </p:txBody>
-      </p:sp>
-      <p:pic>
-        <p:nvPicPr>
-          <p:cNvPr id="6" name="Picture 5">
-            <a:extLst>
-              <a:ext uri="{FF2B5EF4-FFF2-40B4-BE49-F238E27FC236}">
-                <a16:creationId xmlns:a16="http://schemas.microsoft.com/office/drawing/2014/main" id="{BAF64B5A-2A66-4C83-ABAD-0E12EF71EB31}"/>
-              </a:ext>
-            </a:extLst>
-          </p:cNvPr>
-          <p:cNvPicPr>
-            <a:picLocks noChangeAspect="1"/>
-          </p:cNvPicPr>
-          <p:nvPr/>
-        </p:nvPicPr>
-        <p:blipFill>
-          <a:blip r:embed="rId2"/>
-          <a:stretch>
-            <a:fillRect/>
-          </a:stretch>
-        </p:blipFill>
-        <p:spPr>
-          <a:xfrm>
-            <a:off x="5987738" y="898924"/>
-            <a:ext cx="5628018" cy="4827281"/>
-          </a:xfrm>
-          <a:prstGeom prst="rect">
-            <a:avLst/>
-          </a:prstGeom>
-        </p:spPr>
-      </p:pic>
-    </p:spTree>
-    <p:extLst>
-      <p:ext uri="{BB962C8B-B14F-4D97-AF65-F5344CB8AC3E}">
-        <p14:creationId xmlns:p14="http://schemas.microsoft.com/office/powerpoint/2010/main" val="1615087654"/>
-      </p:ext>
-    </p:extLst>
-  </p:cSld>
-  <p:clrMapOvr>
-    <a:masterClrMapping/>
-  </p:clrMapOvr>
-</p:sld>
-</file>
-
-<file path=ppt/slides/slide9.xml><?xml version="1.0" encoding="utf-8"?>
-<p:sld xmlns:a="http://schemas.openxmlformats.org/drawingml/2006/main" xmlns:r="http://schemas.openxmlformats.org/officeDocument/2006/relationships" xmlns:p="http://schemas.openxmlformats.org/presentationml/2006/main">
-  <p:cSld>
-    <p:bg>
-      <p:bgPr>
-        <a:solidFill>
-          <a:schemeClr val="bg1"/>
-        </a:solidFill>
-        <a:effectLst/>
-      </p:bgPr>
-    </p:bg>
-    <p:spTree>
-      <p:nvGrpSpPr>
-        <p:cNvPr id="1" name=""/>
-        <p:cNvGrpSpPr/>
-        <p:nvPr/>
-      </p:nvGrpSpPr>
-      <p:grpSpPr>
-        <a:xfrm>
-          <a:off x="0" y="0"/>
-          <a:ext cx="0" cy="0"/>
-          <a:chOff x="0" y="0"/>
-          <a:chExt cx="0" cy="0"/>
-        </a:xfrm>
-      </p:grpSpPr>
-      <p:sp useBgFill="1">
-        <p:nvSpPr>
-          <p:cNvPr id="10" name="Rectangle 9">
-            <a:extLst>
-              <a:ext uri="{FF2B5EF4-FFF2-40B4-BE49-F238E27FC236}">
-                <a16:creationId xmlns:a16="http://schemas.microsoft.com/office/drawing/2014/main" id="{201CC55D-ED54-4C5C-95E6-10947BD1103B}"/>
-              </a:ext>
-              <a:ext uri="{C183D7F6-B498-43B3-948B-1728B52AA6E4}">
-                <adec:decorative xmlns:adec="http://schemas.microsoft.com/office/drawing/2017/decorative" val="1"/>
-              </a:ext>
-            </a:extLst>
-          </p:cNvPr>
-          <p:cNvSpPr>
-            <a:spLocks noGrp="1" noRot="1" noChangeAspect="1" noMove="1" noResize="1" noEditPoints="1" noAdjustHandles="1" noChangeArrowheads="1" noChangeShapeType="1" noTextEdit="1"/>
-          </p:cNvSpPr>
-          <p:nvPr>
-            <p:extLst>
-              <p:ext uri="{386F3935-93C4-4BCD-93E2-E3B085C9AB24}">
-                <p16:designElem xmlns:p16="http://schemas.microsoft.com/office/powerpoint/2015/main" val="1"/>
-              </p:ext>
-            </p:extLst>
-          </p:nvPr>
-        </p:nvSpPr>
-        <p:spPr>
-          <a:xfrm>
-            <a:off x="0" y="0"/>
-            <a:ext cx="12191999" cy="6857365"/>
-          </a:xfrm>
-          <a:prstGeom prst="rect">
-            <a:avLst/>
-          </a:prstGeom>
-          <a:ln>
-            <a:noFill/>
-          </a:ln>
-        </p:spPr>
-        <p:style>
-          <a:lnRef idx="2">
-            <a:schemeClr val="accent1">
-              <a:shade val="50000"/>
-            </a:schemeClr>
-          </a:lnRef>
-          <a:fillRef idx="1">
-            <a:schemeClr val="accent1"/>
-          </a:fillRef>
-          <a:effectRef idx="0">
-            <a:schemeClr val="accent1"/>
-          </a:effectRef>
-          <a:fontRef idx="minor">
-            <a:schemeClr val="lt1"/>
-          </a:fontRef>
-        </p:style>
-        <p:txBody>
-          <a:bodyPr rtlCol="0" anchor="ctr"/>
-          <a:lstStyle/>
-          <a:p>
-            <a:pPr algn="ctr"/>
-            <a:endParaRPr lang="en-US"/>
-          </a:p>
-        </p:txBody>
-      </p:sp>
-      <p:sp>
-        <p:nvSpPr>
-          <p:cNvPr id="2" name="Title 1">
-            <a:extLst>
-              <a:ext uri="{FF2B5EF4-FFF2-40B4-BE49-F238E27FC236}">
-                <a16:creationId xmlns:a16="http://schemas.microsoft.com/office/drawing/2014/main" id="{82410C0E-F0C4-3809-BAF5-5AD517A10986}"/>
-              </a:ext>
-            </a:extLst>
-          </p:cNvPr>
-          <p:cNvSpPr>
-            <a:spLocks noGrp="1"/>
-          </p:cNvSpPr>
-          <p:nvPr>
-            <p:ph type="title"/>
-          </p:nvPr>
-        </p:nvSpPr>
-        <p:spPr>
-          <a:xfrm>
-            <a:off x="589560" y="856180"/>
-            <a:ext cx="4560584" cy="1128068"/>
-          </a:xfrm>
-        </p:spPr>
-        <p:txBody>
-          <a:bodyPr anchor="ctr">
-            <a:normAutofit fontScale="90000"/>
-          </a:bodyPr>
-          <a:lstStyle/>
-          <a:p>
-            <a:r>
-              <a:rPr lang="en-US" sz="4000" dirty="0"/>
-              <a:t>Version Control you data and code</a:t>
-            </a:r>
-          </a:p>
-        </p:txBody>
-      </p:sp>
-      <p:grpSp>
-        <p:nvGrpSpPr>
-          <p:cNvPr id="12" name="Group 11">
-            <a:extLst>
-              <a:ext uri="{FF2B5EF4-FFF2-40B4-BE49-F238E27FC236}">
-                <a16:creationId xmlns:a16="http://schemas.microsoft.com/office/drawing/2014/main" id="{1DE889C7-FAD6-4397-98E2-05D503484459}"/>
-              </a:ext>
-              <a:ext uri="{C183D7F6-B498-43B3-948B-1728B52AA6E4}">
-                <adec:decorative xmlns:adec="http://schemas.microsoft.com/office/drawing/2017/decorative" val="1"/>
-              </a:ext>
-            </a:extLst>
-          </p:cNvPr>
-          <p:cNvGrpSpPr>
-            <a:grpSpLocks noGrp="1" noUngrp="1" noRot="1" noChangeAspect="1" noMove="1" noResize="1"/>
-          </p:cNvGrpSpPr>
-          <p:nvPr>
-            <p:extLst>
-              <p:ext uri="{386F3935-93C4-4BCD-93E2-E3B085C9AB24}">
-                <p16:designElem xmlns:p16="http://schemas.microsoft.com/office/powerpoint/2015/main" val="1"/>
-              </p:ext>
-            </p:extLst>
-          </p:nvPr>
-        </p:nvGrpSpPr>
-        <p:grpSpPr>
-          <a:xfrm>
-            <a:off x="0" y="1083484"/>
-            <a:ext cx="355196" cy="673460"/>
-            <a:chOff x="0" y="823811"/>
-            <a:chExt cx="355196" cy="673460"/>
-          </a:xfrm>
-        </p:grpSpPr>
-        <p:sp>
-          <p:nvSpPr>
-            <p:cNvPr id="13" name="Rectangle 12">
-              <a:extLst>
-                <a:ext uri="{FF2B5EF4-FFF2-40B4-BE49-F238E27FC236}">
-                  <a16:creationId xmlns:a16="http://schemas.microsoft.com/office/drawing/2014/main" id="{F399A70F-F8CD-4992-9EF5-6CF15472E73F}"/>
-                </a:ext>
-                <a:ext uri="{C183D7F6-B498-43B3-948B-1728B52AA6E4}">
-                  <adec:decorative xmlns:adec="http://schemas.microsoft.com/office/drawing/2017/decorative" val="1"/>
-                </a:ext>
-              </a:extLst>
-            </p:cNvPr>
-            <p:cNvSpPr/>
-            <p:nvPr>
-              <p:extLst>
-                <p:ext uri="{386F3935-93C4-4BCD-93E2-E3B085C9AB24}">
-                  <p16:designElem xmlns:p16="http://schemas.microsoft.com/office/powerpoint/2015/main" val="1"/>
-                </p:ext>
-              </p:extLst>
-            </p:nvPr>
-          </p:nvSpPr>
-          <p:spPr>
-            <a:xfrm>
-              <a:off x="0" y="823811"/>
-              <a:ext cx="87363" cy="673460"/>
-            </a:xfrm>
-            <a:prstGeom prst="rect">
-              <a:avLst/>
-            </a:prstGeom>
-            <a:solidFill>
-              <a:schemeClr val="accent4"/>
-            </a:solidFill>
-            <a:ln>
-              <a:noFill/>
-            </a:ln>
-          </p:spPr>
-          <p:style>
-            <a:lnRef idx="2">
-              <a:schemeClr val="accent1">
-                <a:shade val="50000"/>
-              </a:schemeClr>
-            </a:lnRef>
-            <a:fillRef idx="1">
-              <a:schemeClr val="accent1"/>
-            </a:fillRef>
-            <a:effectRef idx="0">
-              <a:schemeClr val="accent1"/>
-            </a:effectRef>
-            <a:fontRef idx="minor">
-              <a:schemeClr val="lt1"/>
-            </a:fontRef>
-          </p:style>
-          <p:txBody>
-            <a:bodyPr rtlCol="0" anchor="ctr"/>
-            <a:lstStyle/>
-            <a:p>
-              <a:pPr algn="ctr"/>
-              <a:endParaRPr lang="en-US"/>
-            </a:p>
-          </p:txBody>
-        </p:sp>
-        <p:sp>
-          <p:nvSpPr>
-            <p:cNvPr id="14" name="Rectangle 13">
-              <a:extLst>
-                <a:ext uri="{FF2B5EF4-FFF2-40B4-BE49-F238E27FC236}">
-                  <a16:creationId xmlns:a16="http://schemas.microsoft.com/office/drawing/2014/main" id="{48F4FEDC-6D80-458C-A665-075D9B9500FD}"/>
-                </a:ext>
-                <a:ext uri="{C183D7F6-B498-43B3-948B-1728B52AA6E4}">
-                  <adec:decorative xmlns:adec="http://schemas.microsoft.com/office/drawing/2017/decorative" val="1"/>
-                </a:ext>
-              </a:extLst>
-            </p:cNvPr>
-            <p:cNvSpPr/>
-            <p:nvPr>
-              <p:extLst>
-                <p:ext uri="{386F3935-93C4-4BCD-93E2-E3B085C9AB24}">
-                  <p16:designElem xmlns:p16="http://schemas.microsoft.com/office/powerpoint/2015/main" val="1"/>
-                </p:ext>
-              </p:extLst>
-            </p:nvPr>
-          </p:nvSpPr>
-          <p:spPr>
-            <a:xfrm>
-              <a:off x="159341" y="823811"/>
-              <a:ext cx="195855" cy="673460"/>
-            </a:xfrm>
-            <a:prstGeom prst="rect">
-              <a:avLst/>
-            </a:prstGeom>
-            <a:solidFill>
-              <a:schemeClr val="accent4"/>
-            </a:solidFill>
-            <a:ln>
-              <a:noFill/>
-            </a:ln>
-          </p:spPr>
-          <p:style>
-            <a:lnRef idx="2">
-              <a:schemeClr val="accent1">
-                <a:shade val="50000"/>
-              </a:schemeClr>
-            </a:lnRef>
-            <a:fillRef idx="1">
-              <a:schemeClr val="accent1"/>
-            </a:fillRef>
-            <a:effectRef idx="0">
-              <a:schemeClr val="accent1"/>
-            </a:effectRef>
-            <a:fontRef idx="minor">
-              <a:schemeClr val="lt1"/>
-            </a:fontRef>
-          </p:style>
-          <p:txBody>
-            <a:bodyPr rtlCol="0" anchor="ctr"/>
-            <a:lstStyle/>
-            <a:p>
-              <a:pPr algn="ctr"/>
-              <a:endParaRPr lang="en-US"/>
-            </a:p>
-          </p:txBody>
-        </p:sp>
-      </p:grpSp>
-      <p:sp>
-        <p:nvSpPr>
-          <p:cNvPr id="16" name="Rectangle 15">
-            <a:extLst>
-              <a:ext uri="{FF2B5EF4-FFF2-40B4-BE49-F238E27FC236}">
-                <a16:creationId xmlns:a16="http://schemas.microsoft.com/office/drawing/2014/main" id="{3873B707-463F-40B0-8227-E8CC6C67EB25}"/>
-              </a:ext>
-              <a:ext uri="{C183D7F6-B498-43B3-948B-1728B52AA6E4}">
-                <adec:decorative xmlns:adec="http://schemas.microsoft.com/office/drawing/2017/decorative" val="1"/>
-              </a:ext>
-            </a:extLst>
-          </p:cNvPr>
-          <p:cNvSpPr>
-            <a:spLocks noGrp="1" noRot="1" noChangeAspect="1" noMove="1" noResize="1" noEditPoints="1" noAdjustHandles="1" noChangeArrowheads="1" noChangeShapeType="1" noTextEdit="1"/>
-          </p:cNvSpPr>
-          <p:nvPr>
-            <p:extLst>
-              <p:ext uri="{386F3935-93C4-4BCD-93E2-E3B085C9AB24}">
-                <p16:designElem xmlns:p16="http://schemas.microsoft.com/office/powerpoint/2015/main" val="1"/>
-              </p:ext>
-            </p:extLst>
-          </p:nvPr>
-        </p:nvSpPr>
-        <p:spPr>
-          <a:xfrm flipH="1">
-            <a:off x="665085" y="2090569"/>
-            <a:ext cx="4297680" cy="27432"/>
-          </a:xfrm>
-          <a:prstGeom prst="rect">
-            <a:avLst/>
-          </a:prstGeom>
-          <a:solidFill>
-            <a:schemeClr val="accent4"/>
-          </a:solidFill>
-          <a:ln>
-            <a:noFill/>
-          </a:ln>
-        </p:spPr>
-        <p:style>
-          <a:lnRef idx="2">
-            <a:schemeClr val="accent1">
-              <a:shade val="50000"/>
-            </a:schemeClr>
-          </a:lnRef>
-          <a:fillRef idx="1">
-            <a:schemeClr val="accent1"/>
-          </a:fillRef>
-          <a:effectRef idx="0">
-            <a:schemeClr val="accent1"/>
-          </a:effectRef>
-          <a:fontRef idx="minor">
-            <a:schemeClr val="lt1"/>
-          </a:fontRef>
-        </p:style>
-        <p:txBody>
-          <a:bodyPr rtlCol="0" anchor="ctr"/>
-          <a:lstStyle/>
-          <a:p>
-            <a:pPr algn="ctr"/>
-            <a:endParaRPr lang="en-US"/>
-          </a:p>
-        </p:txBody>
-      </p:sp>
-      <p:sp>
-        <p:nvSpPr>
-          <p:cNvPr id="3" name="Content Placeholder 2">
-            <a:extLst>
-              <a:ext uri="{FF2B5EF4-FFF2-40B4-BE49-F238E27FC236}">
-                <a16:creationId xmlns:a16="http://schemas.microsoft.com/office/drawing/2014/main" id="{1D1EE2FF-2181-6760-3BDF-1D33443D5955}"/>
-              </a:ext>
-            </a:extLst>
-          </p:cNvPr>
-          <p:cNvSpPr>
-            <a:spLocks noGrp="1"/>
-          </p:cNvSpPr>
-          <p:nvPr>
-            <p:ph idx="1"/>
-          </p:nvPr>
-        </p:nvSpPr>
-        <p:spPr>
-          <a:xfrm>
-            <a:off x="590719" y="2330505"/>
-            <a:ext cx="4559425" cy="3979585"/>
-          </a:xfrm>
-        </p:spPr>
-        <p:txBody>
-          <a:bodyPr anchor="ctr">
-            <a:normAutofit/>
-          </a:bodyPr>
-          <a:lstStyle/>
-          <a:p>
-            <a:r>
-              <a:rPr lang="en-US" sz="2000" dirty="0">
-                <a:latin typeface="+mj-lt"/>
-              </a:rPr>
-              <a:t>Git: </a:t>
-            </a:r>
-            <a:r>
-              <a:rPr lang="en-US" sz="2000" dirty="0">
-                <a:latin typeface="+mj-lt"/>
-                <a:hlinkClick r:id="rId2"/>
-              </a:rPr>
-              <a:t>https://github.com/</a:t>
-            </a:r>
-            <a:r>
-              <a:rPr lang="en-US" sz="2000" dirty="0">
-                <a:latin typeface="+mj-lt"/>
-              </a:rPr>
-              <a:t> </a:t>
-            </a:r>
-          </a:p>
-          <a:p>
-            <a:r>
-              <a:rPr lang="en-US" sz="2000" dirty="0">
-                <a:latin typeface="+mj-lt"/>
-              </a:rPr>
-              <a:t>Drive/Box/Dropbox</a:t>
-            </a:r>
-          </a:p>
-          <a:p>
-            <a:r>
-              <a:rPr lang="en-US" sz="2000" dirty="0">
-                <a:latin typeface="+mj-lt"/>
-              </a:rPr>
-              <a:t>Local external hard-disk</a:t>
-            </a:r>
-          </a:p>
-          <a:p>
-            <a:endParaRPr lang="en-US" sz="2000" dirty="0"/>
-          </a:p>
-        </p:txBody>
-      </p:sp>
-      <p:sp>
-        <p:nvSpPr>
-          <p:cNvPr id="18" name="Rectangle 17">
-            <a:extLst>
-              <a:ext uri="{FF2B5EF4-FFF2-40B4-BE49-F238E27FC236}">
-                <a16:creationId xmlns:a16="http://schemas.microsoft.com/office/drawing/2014/main" id="{C13237C8-E62C-4F0D-A318-BD6FB6C2D138}"/>
-              </a:ext>
-              <a:ext uri="{C183D7F6-B498-43B3-948B-1728B52AA6E4}">
-                <adec:decorative xmlns:adec="http://schemas.microsoft.com/office/drawing/2017/decorative" val="1"/>
-              </a:ext>
-            </a:extLst>
-          </p:cNvPr>
-          <p:cNvSpPr>
-            <a:spLocks noGrp="1" noRot="1" noChangeAspect="1" noMove="1" noResize="1" noEditPoints="1" noAdjustHandles="1" noChangeArrowheads="1" noChangeShapeType="1" noTextEdit="1"/>
-          </p:cNvSpPr>
-          <p:nvPr>
-            <p:extLst>
-              <p:ext uri="{386F3935-93C4-4BCD-93E2-E3B085C9AB24}">
-                <p16:designElem xmlns:p16="http://schemas.microsoft.com/office/powerpoint/2015/main" val="1"/>
-              </p:ext>
-            </p:extLst>
-          </p:nvPr>
-        </p:nvSpPr>
-        <p:spPr>
-          <a:xfrm flipH="1">
-            <a:off x="10697670" y="0"/>
-            <a:ext cx="1494330" cy="6858000"/>
-          </a:xfrm>
-          <a:prstGeom prst="rect">
-            <a:avLst/>
-          </a:prstGeom>
-          <a:solidFill>
-            <a:schemeClr val="accent4"/>
-          </a:solidFill>
-          <a:ln>
-            <a:noFill/>
-          </a:ln>
-        </p:spPr>
-        <p:style>
-          <a:lnRef idx="2">
-            <a:schemeClr val="accent1">
-              <a:shade val="50000"/>
-            </a:schemeClr>
-          </a:lnRef>
-          <a:fillRef idx="1">
-            <a:schemeClr val="accent1"/>
-          </a:fillRef>
-          <a:effectRef idx="0">
-            <a:schemeClr val="accent1"/>
-          </a:effectRef>
-          <a:fontRef idx="minor">
-            <a:schemeClr val="lt1"/>
-          </a:fontRef>
-        </p:style>
-        <p:txBody>
-          <a:bodyPr rtlCol="0" anchor="ctr"/>
-          <a:lstStyle/>
-          <a:p>
-            <a:pPr algn="ctr"/>
-            <a:endParaRPr lang="en-US"/>
-          </a:p>
-        </p:txBody>
-      </p:sp>
-      <p:sp>
-        <p:nvSpPr>
-          <p:cNvPr id="20" name="Rectangle 19">
-            <a:extLst>
-              <a:ext uri="{FF2B5EF4-FFF2-40B4-BE49-F238E27FC236}">
-                <a16:creationId xmlns:a16="http://schemas.microsoft.com/office/drawing/2014/main" id="{19C9EAEA-39D0-4B0E-A0EB-51E7B26740B1}"/>
-              </a:ext>
-              <a:ext uri="{C183D7F6-B498-43B3-948B-1728B52AA6E4}">
-                <adec:decorative xmlns:adec="http://schemas.microsoft.com/office/drawing/2017/decorative" val="1"/>
-              </a:ext>
-            </a:extLst>
-          </p:cNvPr>
-          <p:cNvSpPr>
-            <a:spLocks noGrp="1" noRot="1" noChangeAspect="1" noMove="1" noResize="1" noEditPoints="1" noAdjustHandles="1" noChangeArrowheads="1" noChangeShapeType="1" noTextEdit="1"/>
-          </p:cNvSpPr>
-          <p:nvPr>
-            <p:extLst>
-              <p:ext uri="{386F3935-93C4-4BCD-93E2-E3B085C9AB24}">
-                <p16:designElem xmlns:p16="http://schemas.microsoft.com/office/powerpoint/2015/main" val="1"/>
-              </p:ext>
-            </p:extLst>
-          </p:nvPr>
-        </p:nvSpPr>
-        <p:spPr>
-          <a:xfrm>
-            <a:off x="5685810" y="513853"/>
-            <a:ext cx="6009366" cy="5834577"/>
-          </a:xfrm>
-          <a:prstGeom prst="rect">
-            <a:avLst/>
-          </a:prstGeom>
-          <a:solidFill>
-            <a:schemeClr val="bg1"/>
-          </a:solidFill>
-          <a:ln>
-            <a:noFill/>
-          </a:ln>
-          <a:effectLst>
-            <a:outerShdw blurRad="139700" dist="127000" dir="5400000" algn="t" rotWithShape="0">
-              <a:prstClr val="black">
-                <a:alpha val="15000"/>
-              </a:prstClr>
-            </a:outerShdw>
-          </a:effectLst>
-        </p:spPr>
-        <p:style>
-          <a:lnRef idx="2">
-            <a:schemeClr val="accent1">
-              <a:shade val="50000"/>
-            </a:schemeClr>
-          </a:lnRef>
-          <a:fillRef idx="1">
-            <a:schemeClr val="accent1"/>
-          </a:fillRef>
-          <a:effectRef idx="0">
-            <a:schemeClr val="accent1"/>
-          </a:effectRef>
-          <a:fontRef idx="minor">
-            <a:schemeClr val="lt1"/>
-          </a:fontRef>
-        </p:style>
-        <p:txBody>
-          <a:bodyPr rtlCol="0" anchor="ctr"/>
-          <a:lstStyle/>
-          <a:p>
-            <a:pPr algn="ctr"/>
-            <a:endParaRPr lang="en-US"/>
-          </a:p>
-        </p:txBody>
-      </p:sp>
-      <p:pic>
-        <p:nvPicPr>
-          <p:cNvPr id="5" name="Picture 4">
-            <a:extLst>
-              <a:ext uri="{FF2B5EF4-FFF2-40B4-BE49-F238E27FC236}">
-                <a16:creationId xmlns:a16="http://schemas.microsoft.com/office/drawing/2014/main" id="{E008893F-DF1F-A361-7073-9DAD4A9BE4B0}"/>
+          <p:cNvPr id="4" name="Picture 3">
+            <a:extLst>
+              <a:ext uri="{FF2B5EF4-FFF2-40B4-BE49-F238E27FC236}">
+                <a16:creationId xmlns:a16="http://schemas.microsoft.com/office/drawing/2014/main" id="{1BC27AC9-118C-6CAB-6E46-F3E8C6614406}"/>
               </a:ext>
             </a:extLst>
           </p:cNvPr>
@@ -7867,7 +6230,7 @@
           <p:nvPr/>
         </p:nvPicPr>
         <p:blipFill rotWithShape="1">
-          <a:blip r:embed="rId3"/>
+          <a:blip r:embed="rId2"/>
           <a:srcRect r="12318" b="3"/>
           <a:stretch/>
         </p:blipFill>
@@ -7884,7 +6247,734 @@
     </p:spTree>
     <p:extLst>
       <p:ext uri="{BB962C8B-B14F-4D97-AF65-F5344CB8AC3E}">
-        <p14:creationId xmlns:p14="http://schemas.microsoft.com/office/powerpoint/2010/main" val="1212155217"/>
+        <p14:creationId xmlns:p14="http://schemas.microsoft.com/office/powerpoint/2010/main" val="135633384"/>
+      </p:ext>
+    </p:extLst>
+  </p:cSld>
+  <p:clrMapOvr>
+    <a:masterClrMapping/>
+  </p:clrMapOvr>
+</p:sld>
+</file>
+
+<file path=ppt/slides/slide7.xml><?xml version="1.0" encoding="utf-8"?>
+<p:sld xmlns:a="http://schemas.openxmlformats.org/drawingml/2006/main" xmlns:r="http://schemas.openxmlformats.org/officeDocument/2006/relationships" xmlns:p="http://schemas.openxmlformats.org/presentationml/2006/main">
+  <p:cSld>
+    <p:spTree>
+      <p:nvGrpSpPr>
+        <p:cNvPr id="1" name=""/>
+        <p:cNvGrpSpPr/>
+        <p:nvPr/>
+      </p:nvGrpSpPr>
+      <p:grpSpPr>
+        <a:xfrm>
+          <a:off x="0" y="0"/>
+          <a:ext cx="0" cy="0"/>
+          <a:chOff x="0" y="0"/>
+          <a:chExt cx="0" cy="0"/>
+        </a:xfrm>
+      </p:grpSpPr>
+      <p:sp>
+        <p:nvSpPr>
+          <p:cNvPr id="2" name="Title 1">
+            <a:extLst>
+              <a:ext uri="{FF2B5EF4-FFF2-40B4-BE49-F238E27FC236}">
+                <a16:creationId xmlns:a16="http://schemas.microsoft.com/office/drawing/2014/main" id="{D680281F-6CAC-042C-6B00-0875D6A28AEC}"/>
+              </a:ext>
+            </a:extLst>
+          </p:cNvPr>
+          <p:cNvSpPr>
+            <a:spLocks noGrp="1"/>
+          </p:cNvSpPr>
+          <p:nvPr>
+            <p:ph type="title"/>
+          </p:nvPr>
+        </p:nvSpPr>
+        <p:spPr>
+          <a:xfrm>
+            <a:off x="838200" y="365125"/>
+            <a:ext cx="5139588" cy="1325563"/>
+          </a:xfrm>
+        </p:spPr>
+        <p:txBody>
+          <a:bodyPr>
+            <a:normAutofit/>
+          </a:bodyPr>
+          <a:lstStyle/>
+          <a:p>
+            <a:r>
+              <a:rPr lang="en-US" dirty="0"/>
+              <a:t>Naming Conventions</a:t>
+            </a:r>
+          </a:p>
+        </p:txBody>
+      </p:sp>
+      <p:sp>
+        <p:nvSpPr>
+          <p:cNvPr id="3" name="Content Placeholder 2">
+            <a:extLst>
+              <a:ext uri="{FF2B5EF4-FFF2-40B4-BE49-F238E27FC236}">
+                <a16:creationId xmlns:a16="http://schemas.microsoft.com/office/drawing/2014/main" id="{5F3FC4F0-44EC-3317-45EF-1EEE4F4A0129}"/>
+              </a:ext>
+            </a:extLst>
+          </p:cNvPr>
+          <p:cNvSpPr>
+            <a:spLocks noGrp="1"/>
+          </p:cNvSpPr>
+          <p:nvPr>
+            <p:ph idx="1"/>
+          </p:nvPr>
+        </p:nvSpPr>
+        <p:spPr>
+          <a:xfrm>
+            <a:off x="838200" y="1825625"/>
+            <a:ext cx="5139588" cy="4351338"/>
+          </a:xfrm>
+        </p:spPr>
+        <p:txBody>
+          <a:bodyPr>
+            <a:normAutofit fontScale="92500" lnSpcReduction="10000"/>
+          </a:bodyPr>
+          <a:lstStyle/>
+          <a:p>
+            <a:r>
+              <a:rPr lang="en-US" sz="3200" dirty="0">
+                <a:solidFill>
+                  <a:srgbClr val="414141"/>
+                </a:solidFill>
+                <a:latin typeface="+mj-lt"/>
+              </a:rPr>
+              <a:t>Use </a:t>
+            </a:r>
+            <a:r>
+              <a:rPr lang="en-US" sz="3200" dirty="0" err="1">
+                <a:solidFill>
+                  <a:srgbClr val="414141"/>
+                </a:solidFill>
+                <a:latin typeface="+mj-lt"/>
+              </a:rPr>
+              <a:t>snake_case</a:t>
+            </a:r>
+            <a:r>
+              <a:rPr lang="en-US" sz="3200" dirty="0">
+                <a:solidFill>
+                  <a:srgbClr val="414141"/>
+                </a:solidFill>
+                <a:latin typeface="+mj-lt"/>
+              </a:rPr>
+              <a:t> or kebab-case (no spaces).</a:t>
+            </a:r>
+          </a:p>
+          <a:p>
+            <a:r>
+              <a:rPr lang="en-US" sz="3200" dirty="0">
+                <a:solidFill>
+                  <a:srgbClr val="414141"/>
+                </a:solidFill>
+                <a:latin typeface="+mj-lt"/>
+              </a:rPr>
+              <a:t>Prefix with order if sequential: 01_, 02_, 03_.</a:t>
+            </a:r>
+          </a:p>
+          <a:p>
+            <a:r>
+              <a:rPr lang="en-US" sz="3200" dirty="0">
+                <a:solidFill>
+                  <a:srgbClr val="414141"/>
+                </a:solidFill>
+                <a:latin typeface="+mj-lt"/>
+              </a:rPr>
+              <a:t>Include date (YYYYMMDD) or version (v1.0).</a:t>
+            </a:r>
+          </a:p>
+          <a:p>
+            <a:r>
+              <a:rPr lang="en-US" sz="3200" dirty="0">
+                <a:solidFill>
+                  <a:srgbClr val="414141"/>
+                </a:solidFill>
+                <a:latin typeface="+mj-lt"/>
+              </a:rPr>
+              <a:t>Example: 20251020_west_nile_cleaning.R or bird_migration_2024_raw.csv.</a:t>
+            </a:r>
+          </a:p>
+          <a:p>
+            <a:endParaRPr lang="en-US" dirty="0"/>
+          </a:p>
+        </p:txBody>
+      </p:sp>
+      <p:pic>
+        <p:nvPicPr>
+          <p:cNvPr id="4" name="Picture 3">
+            <a:extLst>
+              <a:ext uri="{FF2B5EF4-FFF2-40B4-BE49-F238E27FC236}">
+                <a16:creationId xmlns:a16="http://schemas.microsoft.com/office/drawing/2014/main" id="{80F2288F-D694-1D4F-FAD2-E9F1A77A7BCD}"/>
+              </a:ext>
+            </a:extLst>
+          </p:cNvPr>
+          <p:cNvPicPr>
+            <a:picLocks noChangeAspect="1"/>
+          </p:cNvPicPr>
+          <p:nvPr/>
+        </p:nvPicPr>
+        <p:blipFill rotWithShape="1">
+          <a:blip r:embed="rId2"/>
+          <a:srcRect r="12318" b="3"/>
+          <a:stretch/>
+        </p:blipFill>
+        <p:spPr>
+          <a:xfrm>
+            <a:off x="5977788" y="799352"/>
+            <a:ext cx="5425410" cy="5259296"/>
+          </a:xfrm>
+          <a:prstGeom prst="rect">
+            <a:avLst/>
+          </a:prstGeom>
+        </p:spPr>
+      </p:pic>
+    </p:spTree>
+    <p:extLst>
+      <p:ext uri="{BB962C8B-B14F-4D97-AF65-F5344CB8AC3E}">
+        <p14:creationId xmlns:p14="http://schemas.microsoft.com/office/powerpoint/2010/main" val="1574075647"/>
+      </p:ext>
+    </p:extLst>
+  </p:cSld>
+  <p:clrMapOvr>
+    <a:masterClrMapping/>
+  </p:clrMapOvr>
+</p:sld>
+</file>
+
+<file path=ppt/slides/slide8.xml><?xml version="1.0" encoding="utf-8"?>
+<p:sld xmlns:a="http://schemas.openxmlformats.org/drawingml/2006/main" xmlns:r="http://schemas.openxmlformats.org/officeDocument/2006/relationships" xmlns:p="http://schemas.openxmlformats.org/presentationml/2006/main">
+  <p:cSld>
+    <p:spTree>
+      <p:nvGrpSpPr>
+        <p:cNvPr id="1" name="">
+          <a:extLst>
+            <a:ext uri="{FF2B5EF4-FFF2-40B4-BE49-F238E27FC236}">
+              <a16:creationId xmlns:a16="http://schemas.microsoft.com/office/drawing/2014/main" id="{1F71D031-EB05-7CD1-91B2-133B4AF2C24F}"/>
+            </a:ext>
+          </a:extLst>
+        </p:cNvPr>
+        <p:cNvGrpSpPr/>
+        <p:nvPr/>
+      </p:nvGrpSpPr>
+      <p:grpSpPr>
+        <a:xfrm>
+          <a:off x="0" y="0"/>
+          <a:ext cx="0" cy="0"/>
+          <a:chOff x="0" y="0"/>
+          <a:chExt cx="0" cy="0"/>
+        </a:xfrm>
+      </p:grpSpPr>
+      <p:sp>
+        <p:nvSpPr>
+          <p:cNvPr id="2" name="Title 1">
+            <a:extLst>
+              <a:ext uri="{FF2B5EF4-FFF2-40B4-BE49-F238E27FC236}">
+                <a16:creationId xmlns:a16="http://schemas.microsoft.com/office/drawing/2014/main" id="{56CA7FF4-BB33-4663-1D39-06847AA38D47}"/>
+              </a:ext>
+            </a:extLst>
+          </p:cNvPr>
+          <p:cNvSpPr>
+            <a:spLocks noGrp="1"/>
+          </p:cNvSpPr>
+          <p:nvPr>
+            <p:ph type="title"/>
+          </p:nvPr>
+        </p:nvSpPr>
+        <p:spPr>
+          <a:xfrm>
+            <a:off x="838200" y="365125"/>
+            <a:ext cx="5139588" cy="1325563"/>
+          </a:xfrm>
+        </p:spPr>
+        <p:txBody>
+          <a:bodyPr>
+            <a:normAutofit/>
+          </a:bodyPr>
+          <a:lstStyle/>
+          <a:p>
+            <a:r>
+              <a:rPr lang="en-US" dirty="0"/>
+              <a:t>Naming Conventions</a:t>
+            </a:r>
+            <a:endParaRPr lang="en-US" sz="3600" dirty="0">
+              <a:solidFill>
+                <a:srgbClr val="414141"/>
+              </a:solidFill>
+              <a:ea typeface="+mn-ea"/>
+              <a:cs typeface="+mn-cs"/>
+            </a:endParaRPr>
+          </a:p>
+        </p:txBody>
+      </p:sp>
+      <p:sp>
+        <p:nvSpPr>
+          <p:cNvPr id="3" name="Content Placeholder 2">
+            <a:extLst>
+              <a:ext uri="{FF2B5EF4-FFF2-40B4-BE49-F238E27FC236}">
+                <a16:creationId xmlns:a16="http://schemas.microsoft.com/office/drawing/2014/main" id="{17A87E82-4697-186B-59D3-C72F617EF481}"/>
+              </a:ext>
+            </a:extLst>
+          </p:cNvPr>
+          <p:cNvSpPr>
+            <a:spLocks noGrp="1"/>
+          </p:cNvSpPr>
+          <p:nvPr>
+            <p:ph idx="1"/>
+          </p:nvPr>
+        </p:nvSpPr>
+        <p:spPr>
+          <a:xfrm>
+            <a:off x="838200" y="1825625"/>
+            <a:ext cx="5139588" cy="4351338"/>
+          </a:xfrm>
+        </p:spPr>
+        <p:txBody>
+          <a:bodyPr>
+            <a:normAutofit fontScale="62500" lnSpcReduction="20000"/>
+          </a:bodyPr>
+          <a:lstStyle/>
+          <a:p>
+            <a:pPr>
+              <a:lnSpc>
+                <a:spcPct val="100000"/>
+              </a:lnSpc>
+            </a:pPr>
+            <a:r>
+              <a:rPr lang="en-US" sz="3500" dirty="0">
+                <a:solidFill>
+                  <a:srgbClr val="414141"/>
+                </a:solidFill>
+                <a:latin typeface="+mj-lt"/>
+              </a:rPr>
+              <a:t>e.g., camelCase or </a:t>
+            </a:r>
+            <a:r>
+              <a:rPr lang="en-US" sz="3500" dirty="0" err="1">
+                <a:solidFill>
+                  <a:srgbClr val="414141"/>
+                </a:solidFill>
+                <a:latin typeface="+mj-lt"/>
+              </a:rPr>
+              <a:t>snake_case</a:t>
+            </a:r>
+            <a:r>
+              <a:rPr lang="en-US" sz="3500" dirty="0">
+                <a:solidFill>
+                  <a:srgbClr val="414141"/>
+                </a:solidFill>
+                <a:latin typeface="+mj-lt"/>
+              </a:rPr>
+              <a:t> to name objects </a:t>
+            </a:r>
+          </a:p>
+          <a:p>
+            <a:pPr>
+              <a:lnSpc>
+                <a:spcPct val="100000"/>
+              </a:lnSpc>
+            </a:pPr>
+            <a:r>
+              <a:rPr lang="en-US" sz="3500" dirty="0">
+                <a:solidFill>
+                  <a:srgbClr val="414141"/>
+                </a:solidFill>
+                <a:latin typeface="+mj-lt"/>
+              </a:rPr>
+              <a:t>embedding meaningful information in object names </a:t>
+            </a:r>
+          </a:p>
+          <a:p>
+            <a:pPr marL="228600" lvl="1">
+              <a:lnSpc>
+                <a:spcPct val="100000"/>
+              </a:lnSpc>
+              <a:spcBef>
+                <a:spcPts val="1000"/>
+              </a:spcBef>
+            </a:pPr>
+            <a:r>
+              <a:rPr lang="en-US" sz="3500" dirty="0">
+                <a:solidFill>
+                  <a:srgbClr val="414141"/>
+                </a:solidFill>
+                <a:latin typeface="+mj-lt"/>
+              </a:rPr>
+              <a:t>using “_mat” as a suffix :: matrices </a:t>
+            </a:r>
+          </a:p>
+          <a:p>
+            <a:pPr marL="228600" lvl="1">
+              <a:lnSpc>
+                <a:spcPct val="100000"/>
+              </a:lnSpc>
+              <a:spcBef>
+                <a:spcPts val="1000"/>
+              </a:spcBef>
+            </a:pPr>
+            <a:r>
+              <a:rPr lang="en-US" sz="3500" dirty="0">
+                <a:solidFill>
+                  <a:srgbClr val="414141"/>
+                </a:solidFill>
+                <a:latin typeface="+mj-lt"/>
+              </a:rPr>
+              <a:t>“_</a:t>
+            </a:r>
+            <a:r>
+              <a:rPr lang="en-US" sz="3500" dirty="0" err="1">
+                <a:solidFill>
+                  <a:srgbClr val="414141"/>
+                </a:solidFill>
+                <a:latin typeface="+mj-lt"/>
+              </a:rPr>
+              <a:t>df</a:t>
+            </a:r>
+            <a:r>
+              <a:rPr lang="en-US" sz="3500" dirty="0">
+                <a:solidFill>
+                  <a:srgbClr val="414141"/>
+                </a:solidFill>
+                <a:latin typeface="+mj-lt"/>
+              </a:rPr>
+              <a:t>” :: denote data frames</a:t>
+            </a:r>
+          </a:p>
+          <a:p>
+            <a:pPr marL="228600" lvl="1">
+              <a:lnSpc>
+                <a:spcPct val="100000"/>
+              </a:lnSpc>
+              <a:spcBef>
+                <a:spcPts val="1000"/>
+              </a:spcBef>
+            </a:pPr>
+            <a:endParaRPr lang="en-US" sz="3500" dirty="0">
+              <a:solidFill>
+                <a:srgbClr val="414141"/>
+              </a:solidFill>
+              <a:latin typeface="+mj-lt"/>
+            </a:endParaRPr>
+          </a:p>
+          <a:p>
+            <a:pPr>
+              <a:lnSpc>
+                <a:spcPct val="100000"/>
+              </a:lnSpc>
+            </a:pPr>
+            <a:r>
+              <a:rPr lang="en-US" sz="3500" dirty="0">
+                <a:solidFill>
+                  <a:srgbClr val="414141"/>
+                </a:solidFill>
+                <a:latin typeface="+mj-lt"/>
+              </a:rPr>
+              <a:t>Descriptive</a:t>
+            </a:r>
+          </a:p>
+          <a:p>
+            <a:pPr>
+              <a:lnSpc>
+                <a:spcPct val="100000"/>
+              </a:lnSpc>
+            </a:pPr>
+            <a:r>
+              <a:rPr lang="en-US" sz="3500" dirty="0">
+                <a:solidFill>
+                  <a:srgbClr val="414141"/>
+                </a:solidFill>
+                <a:latin typeface="+mj-lt"/>
+              </a:rPr>
+              <a:t>Consistent</a:t>
+            </a:r>
+          </a:p>
+          <a:p>
+            <a:pPr>
+              <a:lnSpc>
+                <a:spcPct val="100000"/>
+              </a:lnSpc>
+            </a:pPr>
+            <a:r>
+              <a:rPr lang="en-US" sz="3500" dirty="0">
+                <a:solidFill>
+                  <a:srgbClr val="414141"/>
+                </a:solidFill>
+                <a:latin typeface="+mj-lt"/>
+              </a:rPr>
+              <a:t>Human readable</a:t>
+            </a:r>
+          </a:p>
+          <a:p>
+            <a:pPr>
+              <a:lnSpc>
+                <a:spcPct val="100000"/>
+              </a:lnSpc>
+            </a:pPr>
+            <a:r>
+              <a:rPr lang="en-US" sz="3500" dirty="0">
+                <a:solidFill>
+                  <a:srgbClr val="414141"/>
+                </a:solidFill>
+                <a:latin typeface="+mj-lt"/>
+              </a:rPr>
+              <a:t>Machine readable</a:t>
+            </a:r>
+          </a:p>
+          <a:p>
+            <a:endParaRPr lang="en-US" dirty="0">
+              <a:latin typeface="+mj-lt"/>
+            </a:endParaRPr>
+          </a:p>
+          <a:p>
+            <a:endParaRPr lang="en-US" dirty="0"/>
+          </a:p>
+        </p:txBody>
+      </p:sp>
+      <p:pic>
+        <p:nvPicPr>
+          <p:cNvPr id="4" name="Picture 3">
+            <a:extLst>
+              <a:ext uri="{FF2B5EF4-FFF2-40B4-BE49-F238E27FC236}">
+                <a16:creationId xmlns:a16="http://schemas.microsoft.com/office/drawing/2014/main" id="{D93E89D3-B62E-38F5-B43C-4FAC52E35AFF}"/>
+              </a:ext>
+            </a:extLst>
+          </p:cNvPr>
+          <p:cNvPicPr>
+            <a:picLocks noChangeAspect="1"/>
+          </p:cNvPicPr>
+          <p:nvPr/>
+        </p:nvPicPr>
+        <p:blipFill rotWithShape="1">
+          <a:blip r:embed="rId2"/>
+          <a:srcRect r="12318" b="3"/>
+          <a:stretch/>
+        </p:blipFill>
+        <p:spPr>
+          <a:xfrm>
+            <a:off x="5977788" y="799352"/>
+            <a:ext cx="5425410" cy="5259296"/>
+          </a:xfrm>
+          <a:prstGeom prst="rect">
+            <a:avLst/>
+          </a:prstGeom>
+        </p:spPr>
+      </p:pic>
+    </p:spTree>
+    <p:extLst>
+      <p:ext uri="{BB962C8B-B14F-4D97-AF65-F5344CB8AC3E}">
+        <p14:creationId xmlns:p14="http://schemas.microsoft.com/office/powerpoint/2010/main" val="3425994706"/>
+      </p:ext>
+    </p:extLst>
+  </p:cSld>
+  <p:clrMapOvr>
+    <a:masterClrMapping/>
+  </p:clrMapOvr>
+</p:sld>
+</file>
+
+<file path=ppt/slides/slide9.xml><?xml version="1.0" encoding="utf-8"?>
+<p:sld xmlns:a="http://schemas.openxmlformats.org/drawingml/2006/main" xmlns:r="http://schemas.openxmlformats.org/officeDocument/2006/relationships" xmlns:p="http://schemas.openxmlformats.org/presentationml/2006/main">
+  <p:cSld>
+    <p:spTree>
+      <p:nvGrpSpPr>
+        <p:cNvPr id="1" name="">
+          <a:extLst>
+            <a:ext uri="{FF2B5EF4-FFF2-40B4-BE49-F238E27FC236}">
+              <a16:creationId xmlns:a16="http://schemas.microsoft.com/office/drawing/2014/main" id="{902F180E-D9C3-BA77-A3F1-5702008BE27B}"/>
+            </a:ext>
+          </a:extLst>
+        </p:cNvPr>
+        <p:cNvGrpSpPr/>
+        <p:nvPr/>
+      </p:nvGrpSpPr>
+      <p:grpSpPr>
+        <a:xfrm>
+          <a:off x="0" y="0"/>
+          <a:ext cx="0" cy="0"/>
+          <a:chOff x="0" y="0"/>
+          <a:chExt cx="0" cy="0"/>
+        </a:xfrm>
+      </p:grpSpPr>
+      <p:sp>
+        <p:nvSpPr>
+          <p:cNvPr id="2" name="Title 1">
+            <a:extLst>
+              <a:ext uri="{FF2B5EF4-FFF2-40B4-BE49-F238E27FC236}">
+                <a16:creationId xmlns:a16="http://schemas.microsoft.com/office/drawing/2014/main" id="{371DE710-4EDB-391D-8C63-32CF9CDAFA85}"/>
+              </a:ext>
+            </a:extLst>
+          </p:cNvPr>
+          <p:cNvSpPr>
+            <a:spLocks noGrp="1"/>
+          </p:cNvSpPr>
+          <p:nvPr>
+            <p:ph type="title"/>
+          </p:nvPr>
+        </p:nvSpPr>
+        <p:spPr>
+          <a:xfrm>
+            <a:off x="838200" y="365125"/>
+            <a:ext cx="5139588" cy="1325563"/>
+          </a:xfrm>
+        </p:spPr>
+        <p:txBody>
+          <a:bodyPr>
+            <a:normAutofit/>
+          </a:bodyPr>
+          <a:lstStyle/>
+          <a:p>
+            <a:r>
+              <a:rPr lang="en-US" dirty="0"/>
+              <a:t>Data Management and Backup</a:t>
+            </a:r>
+          </a:p>
+        </p:txBody>
+      </p:sp>
+      <p:sp>
+        <p:nvSpPr>
+          <p:cNvPr id="3" name="Content Placeholder 2">
+            <a:extLst>
+              <a:ext uri="{FF2B5EF4-FFF2-40B4-BE49-F238E27FC236}">
+                <a16:creationId xmlns:a16="http://schemas.microsoft.com/office/drawing/2014/main" id="{0BC57EDC-20E8-D2FE-1717-DD3CF4676A69}"/>
+              </a:ext>
+            </a:extLst>
+          </p:cNvPr>
+          <p:cNvSpPr>
+            <a:spLocks noGrp="1"/>
+          </p:cNvSpPr>
+          <p:nvPr>
+            <p:ph idx="1"/>
+          </p:nvPr>
+        </p:nvSpPr>
+        <p:spPr>
+          <a:xfrm>
+            <a:off x="838200" y="1825625"/>
+            <a:ext cx="5139588" cy="4351338"/>
+          </a:xfrm>
+        </p:spPr>
+        <p:txBody>
+          <a:bodyPr>
+            <a:normAutofit lnSpcReduction="10000"/>
+          </a:bodyPr>
+          <a:lstStyle/>
+          <a:p>
+            <a:r>
+              <a:rPr lang="en-US" sz="3200" dirty="0">
+                <a:solidFill>
+                  <a:srgbClr val="414141"/>
+                </a:solidFill>
+                <a:latin typeface="+mj-lt"/>
+              </a:rPr>
+              <a:t>Store raw and derived data separately.</a:t>
+            </a:r>
+          </a:p>
+          <a:p>
+            <a:r>
+              <a:rPr lang="en-US" sz="3200" dirty="0">
+                <a:solidFill>
+                  <a:srgbClr val="414141"/>
+                </a:solidFill>
+                <a:latin typeface="+mj-lt"/>
+              </a:rPr>
+              <a:t>Maintain a data dictionary (data_description.xlsx).</a:t>
+            </a:r>
+          </a:p>
+          <a:p>
+            <a:r>
+              <a:rPr lang="en-US" sz="3200" dirty="0">
+                <a:solidFill>
+                  <a:srgbClr val="414141"/>
+                </a:solidFill>
+                <a:latin typeface="+mj-lt"/>
+              </a:rPr>
+              <a:t>Keep metadata about data source and processing.</a:t>
+            </a:r>
+          </a:p>
+          <a:p>
+            <a:r>
+              <a:rPr lang="en-US" sz="3200" dirty="0">
+                <a:solidFill>
+                  <a:srgbClr val="414141"/>
+                </a:solidFill>
+                <a:latin typeface="+mj-lt"/>
+              </a:rPr>
+              <a:t>Backup options: Box, Google Drive, GitHub, or </a:t>
+            </a:r>
+            <a:r>
+              <a:rPr lang="en-US" sz="3200" dirty="0" err="1">
+                <a:solidFill>
+                  <a:srgbClr val="414141"/>
+                </a:solidFill>
+                <a:latin typeface="+mj-lt"/>
+              </a:rPr>
+              <a:t>rsync</a:t>
+            </a:r>
+            <a:r>
+              <a:rPr lang="en-US" sz="3200" dirty="0">
+                <a:solidFill>
+                  <a:srgbClr val="414141"/>
+                </a:solidFill>
+                <a:latin typeface="+mj-lt"/>
+              </a:rPr>
+              <a:t>/</a:t>
+            </a:r>
+            <a:r>
+              <a:rPr lang="en-US" sz="3200" dirty="0" err="1">
+                <a:solidFill>
+                  <a:srgbClr val="414141"/>
+                </a:solidFill>
+                <a:latin typeface="+mj-lt"/>
+              </a:rPr>
+              <a:t>Backblaze</a:t>
+            </a:r>
+            <a:r>
+              <a:rPr lang="en-US" sz="3200" dirty="0">
+                <a:solidFill>
+                  <a:srgbClr val="414141"/>
+                </a:solidFill>
+                <a:latin typeface="+mj-lt"/>
+              </a:rPr>
+              <a:t>.</a:t>
+            </a:r>
+          </a:p>
+        </p:txBody>
+      </p:sp>
+      <p:pic>
+        <p:nvPicPr>
+          <p:cNvPr id="4" name="Picture 3">
+            <a:extLst>
+              <a:ext uri="{FF2B5EF4-FFF2-40B4-BE49-F238E27FC236}">
+                <a16:creationId xmlns:a16="http://schemas.microsoft.com/office/drawing/2014/main" id="{85C7BF55-C4E4-0058-4FDF-6B0C0236EAA7}"/>
+              </a:ext>
+            </a:extLst>
+          </p:cNvPr>
+          <p:cNvPicPr>
+            <a:picLocks noChangeAspect="1"/>
+          </p:cNvPicPr>
+          <p:nvPr/>
+        </p:nvPicPr>
+        <p:blipFill rotWithShape="1">
+          <a:blip r:embed="rId2"/>
+          <a:srcRect r="12318" b="3"/>
+          <a:stretch/>
+        </p:blipFill>
+        <p:spPr>
+          <a:xfrm>
+            <a:off x="5977788" y="799352"/>
+            <a:ext cx="5425410" cy="5259296"/>
+          </a:xfrm>
+          <a:prstGeom prst="rect">
+            <a:avLst/>
+          </a:prstGeom>
+        </p:spPr>
+      </p:pic>
+    </p:spTree>
+    <p:extLst>
+      <p:ext uri="{BB962C8B-B14F-4D97-AF65-F5344CB8AC3E}">
+        <p14:creationId xmlns:p14="http://schemas.microsoft.com/office/powerpoint/2010/main" val="1913939559"/>
       </p:ext>
     </p:extLst>
   </p:cSld>

</xml_diff>